<commit_message>
update content for powerpnt
</commit_message>
<xml_diff>
--- a/Presentation/Classification-of-time-signals-by-CNN-using-STFT-Paween.pptx
+++ b/Presentation/Classification-of-time-signals-by-CNN-using-STFT-Paween.pptx
@@ -16,8 +16,10 @@
     <p:sldId id="277" r:id="rId10"/>
     <p:sldId id="278" r:id="rId11"/>
     <p:sldId id="276" r:id="rId12"/>
-    <p:sldId id="269" r:id="rId13"/>
-    <p:sldId id="270" r:id="rId14"/>
+    <p:sldId id="279" r:id="rId13"/>
+    <p:sldId id="269" r:id="rId14"/>
+    <p:sldId id="280" r:id="rId15"/>
+    <p:sldId id="270" r:id="rId16"/>
   </p:sldIdLst>
   <p:sldSz cx="12192000" cy="6858000"/>
   <p:notesSz cx="6858000" cy="9144000"/>
@@ -220,6 +222,11 @@
               </a:ln>
               <a:effectLst/>
             </c:spPr>
+            <c:extLst>
+              <c:ext xmlns:c16="http://schemas.microsoft.com/office/drawing/2014/chart" uri="{C3380CC4-5D6E-409C-BE32-E72D297353CC}">
+                <c16:uniqueId val="{00000001-1597-4E05-8AEF-ABB52AF658F4}"/>
+              </c:ext>
+            </c:extLst>
           </c:dPt>
           <c:dPt>
             <c:idx val="1"/>
@@ -235,6 +242,11 @@
               </a:ln>
               <a:effectLst/>
             </c:spPr>
+            <c:extLst>
+              <c:ext xmlns:c16="http://schemas.microsoft.com/office/drawing/2014/chart" uri="{C3380CC4-5D6E-409C-BE32-E72D297353CC}">
+                <c16:uniqueId val="{00000003-1597-4E05-8AEF-ABB52AF658F4}"/>
+              </c:ext>
+            </c:extLst>
           </c:dPt>
           <c:dLbls>
             <c:spPr>
@@ -2633,7 +2645,7 @@
           <a:p>
             <a:fld id="{672A33CF-3CD6-4BF6-9652-92EE052783A5}" type="datetimeFigureOut">
               <a:rPr lang="en-US" smtClean="0"/>
-              <a:t>10/16/2021</a:t>
+              <a:t>10/17/2021</a:t>
             </a:fld>
             <a:endParaRPr lang="en-US"/>
           </a:p>
@@ -2831,7 +2843,7 @@
           <a:p>
             <a:fld id="{672A33CF-3CD6-4BF6-9652-92EE052783A5}" type="datetimeFigureOut">
               <a:rPr lang="en-US" smtClean="0"/>
-              <a:t>10/16/2021</a:t>
+              <a:t>10/17/2021</a:t>
             </a:fld>
             <a:endParaRPr lang="en-US"/>
           </a:p>
@@ -3039,7 +3051,7 @@
           <a:p>
             <a:fld id="{672A33CF-3CD6-4BF6-9652-92EE052783A5}" type="datetimeFigureOut">
               <a:rPr lang="en-US" smtClean="0"/>
-              <a:t>10/16/2021</a:t>
+              <a:t>10/17/2021</a:t>
             </a:fld>
             <a:endParaRPr lang="en-US"/>
           </a:p>
@@ -3237,7 +3249,7 @@
           <a:p>
             <a:fld id="{672A33CF-3CD6-4BF6-9652-92EE052783A5}" type="datetimeFigureOut">
               <a:rPr lang="en-US" smtClean="0"/>
-              <a:t>10/16/2021</a:t>
+              <a:t>10/17/2021</a:t>
             </a:fld>
             <a:endParaRPr lang="en-US"/>
           </a:p>
@@ -3512,7 +3524,7 @@
           <a:p>
             <a:fld id="{672A33CF-3CD6-4BF6-9652-92EE052783A5}" type="datetimeFigureOut">
               <a:rPr lang="en-US" smtClean="0"/>
-              <a:t>10/16/2021</a:t>
+              <a:t>10/17/2021</a:t>
             </a:fld>
             <a:endParaRPr lang="en-US"/>
           </a:p>
@@ -3777,7 +3789,7 @@
           <a:p>
             <a:fld id="{672A33CF-3CD6-4BF6-9652-92EE052783A5}" type="datetimeFigureOut">
               <a:rPr lang="en-US" smtClean="0"/>
-              <a:t>10/16/2021</a:t>
+              <a:t>10/17/2021</a:t>
             </a:fld>
             <a:endParaRPr lang="en-US"/>
           </a:p>
@@ -4189,7 +4201,7 @@
           <a:p>
             <a:fld id="{672A33CF-3CD6-4BF6-9652-92EE052783A5}" type="datetimeFigureOut">
               <a:rPr lang="en-US" smtClean="0"/>
-              <a:t>10/16/2021</a:t>
+              <a:t>10/17/2021</a:t>
             </a:fld>
             <a:endParaRPr lang="en-US"/>
           </a:p>
@@ -4330,7 +4342,7 @@
           <a:p>
             <a:fld id="{672A33CF-3CD6-4BF6-9652-92EE052783A5}" type="datetimeFigureOut">
               <a:rPr lang="en-US" smtClean="0"/>
-              <a:t>10/16/2021</a:t>
+              <a:t>10/17/2021</a:t>
             </a:fld>
             <a:endParaRPr lang="en-US"/>
           </a:p>
@@ -4443,7 +4455,7 @@
           <a:p>
             <a:fld id="{672A33CF-3CD6-4BF6-9652-92EE052783A5}" type="datetimeFigureOut">
               <a:rPr lang="en-US" smtClean="0"/>
-              <a:t>10/16/2021</a:t>
+              <a:t>10/17/2021</a:t>
             </a:fld>
             <a:endParaRPr lang="en-US"/>
           </a:p>
@@ -4754,7 +4766,7 @@
           <a:p>
             <a:fld id="{672A33CF-3CD6-4BF6-9652-92EE052783A5}" type="datetimeFigureOut">
               <a:rPr lang="en-US" smtClean="0"/>
-              <a:t>10/16/2021</a:t>
+              <a:t>10/17/2021</a:t>
             </a:fld>
             <a:endParaRPr lang="en-US"/>
           </a:p>
@@ -5042,7 +5054,7 @@
           <a:p>
             <a:fld id="{672A33CF-3CD6-4BF6-9652-92EE052783A5}" type="datetimeFigureOut">
               <a:rPr lang="en-US" smtClean="0"/>
-              <a:t>10/16/2021</a:t>
+              <a:t>10/17/2021</a:t>
             </a:fld>
             <a:endParaRPr lang="en-US"/>
           </a:p>
@@ -5286,7 +5298,7 @@
           <a:p>
             <a:fld id="{672A33CF-3CD6-4BF6-9652-92EE052783A5}" type="datetimeFigureOut">
               <a:rPr lang="en-US" smtClean="0"/>
-              <a:t>10/16/2021</a:t>
+              <a:t>10/17/2021</a:t>
             </a:fld>
             <a:endParaRPr lang="en-US"/>
           </a:p>
@@ -8021,7 +8033,7 @@
           <p:cNvPr id="9" name="TextBox 8">
             <a:extLst>
               <a:ext uri="{FF2B5EF4-FFF2-40B4-BE49-F238E27FC236}">
-                <a16:creationId xmlns:a16="http://schemas.microsoft.com/office/drawing/2014/main" id="{EF386AD6-4AFA-42FA-AAE8-E232F7B0FC08}"/>
+                <a16:creationId xmlns:a16="http://schemas.microsoft.com/office/drawing/2014/main" id="{A68F5E22-5380-4D89-943B-4B1DDB107462}"/>
               </a:ext>
             </a:extLst>
           </p:cNvPr>
@@ -8064,17 +8076,17 @@
                 <a:ea typeface="+mj-ea"/>
                 <a:cs typeface="Times New Roman" panose="02020603050405020304" pitchFamily="18" charset="0"/>
               </a:rPr>
-              <a:t>Experiment Result</a:t>
+              <a:t>Classification</a:t>
             </a:r>
           </a:p>
         </p:txBody>
       </p:sp>
       <p:sp>
         <p:nvSpPr>
-          <p:cNvPr id="10" name="TextBox 9">
-            <a:extLst>
-              <a:ext uri="{FF2B5EF4-FFF2-40B4-BE49-F238E27FC236}">
-                <a16:creationId xmlns:a16="http://schemas.microsoft.com/office/drawing/2014/main" id="{F03E5F94-69C6-49A4-B533-68928E883BD4}"/>
+          <p:cNvPr id="13" name="TextBox 12">
+            <a:extLst>
+              <a:ext uri="{FF2B5EF4-FFF2-40B4-BE49-F238E27FC236}">
+                <a16:creationId xmlns:a16="http://schemas.microsoft.com/office/drawing/2014/main" id="{42D2F211-5259-4386-A06F-1FBB719B826E}"/>
               </a:ext>
             </a:extLst>
           </p:cNvPr>
@@ -8083,8 +8095,8 @@
         </p:nvSpPr>
         <p:spPr>
           <a:xfrm>
-            <a:off x="643468" y="1782981"/>
-            <a:ext cx="6842935" cy="4393982"/>
+            <a:off x="670705" y="1254142"/>
+            <a:ext cx="8399864" cy="791782"/>
           </a:xfrm>
           <a:prstGeom prst="rect">
             <a:avLst/>
@@ -8096,7 +8108,7 @@
           </a:bodyPr>
           <a:lstStyle/>
           <a:p>
-            <a:pPr indent="-228600">
+            <a:pPr>
               <a:lnSpc>
                 <a:spcPct val="90000"/>
               </a:lnSpc>
@@ -8106,42 +8118,821 @@
               <a:buClr>
                 <a:schemeClr val="accent1"/>
               </a:buClr>
-              <a:buFont typeface="Arial" panose="020B0604020202020204" pitchFamily="34" charset="0"/>
-              <a:buChar char="•"/>
             </a:pPr>
             <a:r>
               <a:rPr lang="en-US" sz="2200" dirty="0">
                 <a:latin typeface="Times New Roman" panose="02020603050405020304" pitchFamily="18" charset="0"/>
                 <a:cs typeface="Times New Roman" panose="02020603050405020304" pitchFamily="18" charset="0"/>
               </a:rPr>
-              <a:t>Font : Times New Roman size 22</a:t>
+              <a:t>We used the CNN model from Training and Testing to classify the unlearned data.</a:t>
             </a:r>
           </a:p>
-          <a:p>
-            <a:pPr indent="-228600">
-              <a:lnSpc>
-                <a:spcPct val="90000"/>
-              </a:lnSpc>
-              <a:spcAft>
-                <a:spcPts val="600"/>
-              </a:spcAft>
-              <a:buClr>
-                <a:schemeClr val="accent1"/>
-              </a:buClr>
-              <a:buFont typeface="Arial" panose="020B0604020202020204" pitchFamily="34" charset="0"/>
-              <a:buChar char="•"/>
-            </a:pPr>
+        </p:txBody>
+      </p:sp>
+      <p:sp>
+        <p:nvSpPr>
+          <p:cNvPr id="14" name="Rectangle: Rounded Corners 13">
+            <a:extLst>
+              <a:ext uri="{FF2B5EF4-FFF2-40B4-BE49-F238E27FC236}">
+                <a16:creationId xmlns:a16="http://schemas.microsoft.com/office/drawing/2014/main" id="{A2379542-B834-45EA-A53F-21D3CA44A19E}"/>
+              </a:ext>
+            </a:extLst>
+          </p:cNvPr>
+          <p:cNvSpPr/>
+          <p:nvPr/>
+        </p:nvSpPr>
+        <p:spPr>
+          <a:xfrm>
+            <a:off x="636230" y="2813739"/>
+            <a:ext cx="822666" cy="317481"/>
+          </a:xfrm>
+          <a:prstGeom prst="roundRect">
+            <a:avLst/>
+          </a:prstGeom>
+        </p:spPr>
+        <p:style>
+          <a:lnRef idx="1">
+            <a:schemeClr val="accent2"/>
+          </a:lnRef>
+          <a:fillRef idx="2">
+            <a:schemeClr val="accent2"/>
+          </a:fillRef>
+          <a:effectRef idx="1">
+            <a:schemeClr val="accent2"/>
+          </a:effectRef>
+          <a:fontRef idx="minor">
+            <a:schemeClr val="dk1"/>
+          </a:fontRef>
+        </p:style>
+        <p:txBody>
+          <a:bodyPr rtlCol="0" anchor="ctr"/>
+          <a:lstStyle/>
+          <a:p>
+            <a:pPr algn="ctr"/>
             <a:endParaRPr lang="en-US" sz="2200" dirty="0">
               <a:latin typeface="Times New Roman" panose="02020603050405020304" pitchFamily="18" charset="0"/>
               <a:cs typeface="Times New Roman" panose="02020603050405020304" pitchFamily="18" charset="0"/>
             </a:endParaRPr>
+          </a:p>
+          <a:p>
+            <a:pPr algn="ctr"/>
+            <a:r>
+              <a:rPr lang="en-US" sz="2200" dirty="0">
+                <a:latin typeface="Times New Roman" panose="02020603050405020304" pitchFamily="18" charset="0"/>
+                <a:cs typeface="Times New Roman" panose="02020603050405020304" pitchFamily="18" charset="0"/>
+              </a:rPr>
+              <a:t>T1</a:t>
+            </a:r>
+          </a:p>
+          <a:p>
+            <a:pPr algn="ctr"/>
+            <a:endParaRPr lang="en-US" sz="2200" dirty="0">
+              <a:latin typeface="Times New Roman" panose="02020603050405020304" pitchFamily="18" charset="0"/>
+              <a:cs typeface="Times New Roman" panose="02020603050405020304" pitchFamily="18" charset="0"/>
+            </a:endParaRPr>
+          </a:p>
+        </p:txBody>
+      </p:sp>
+      <p:sp>
+        <p:nvSpPr>
+          <p:cNvPr id="15" name="Rectangle: Rounded Corners 14">
+            <a:extLst>
+              <a:ext uri="{FF2B5EF4-FFF2-40B4-BE49-F238E27FC236}">
+                <a16:creationId xmlns:a16="http://schemas.microsoft.com/office/drawing/2014/main" id="{BB1F5CB6-C48A-49F0-81B4-1D3A5D6CB22D}"/>
+              </a:ext>
+            </a:extLst>
+          </p:cNvPr>
+          <p:cNvSpPr/>
+          <p:nvPr/>
+        </p:nvSpPr>
+        <p:spPr>
+          <a:xfrm>
+            <a:off x="2972090" y="3573799"/>
+            <a:ext cx="1952249" cy="556352"/>
+          </a:xfrm>
+          <a:prstGeom prst="roundRect">
+            <a:avLst/>
+          </a:prstGeom>
+        </p:spPr>
+        <p:style>
+          <a:lnRef idx="1">
+            <a:schemeClr val="accent1"/>
+          </a:lnRef>
+          <a:fillRef idx="2">
+            <a:schemeClr val="accent1"/>
+          </a:fillRef>
+          <a:effectRef idx="1">
+            <a:schemeClr val="accent1"/>
+          </a:effectRef>
+          <a:fontRef idx="minor">
+            <a:schemeClr val="dk1"/>
+          </a:fontRef>
+        </p:style>
+        <p:txBody>
+          <a:bodyPr rtlCol="0" anchor="ctr"/>
+          <a:lstStyle/>
+          <a:p>
+            <a:pPr algn="ctr"/>
+            <a:r>
+              <a:rPr lang="en-US" sz="2200" dirty="0">
+                <a:latin typeface="Times New Roman" panose="02020603050405020304" pitchFamily="18" charset="0"/>
+                <a:cs typeface="Times New Roman" panose="02020603050405020304" pitchFamily="18" charset="0"/>
+              </a:rPr>
+              <a:t>Preprocessing</a:t>
+            </a:r>
+          </a:p>
+        </p:txBody>
+      </p:sp>
+      <p:sp>
+        <p:nvSpPr>
+          <p:cNvPr id="17" name="Rectangle: Rounded Corners 16">
+            <a:extLst>
+              <a:ext uri="{FF2B5EF4-FFF2-40B4-BE49-F238E27FC236}">
+                <a16:creationId xmlns:a16="http://schemas.microsoft.com/office/drawing/2014/main" id="{86BF2492-6675-4438-9F9D-AECC9EF7E4D1}"/>
+              </a:ext>
+            </a:extLst>
+          </p:cNvPr>
+          <p:cNvSpPr/>
+          <p:nvPr/>
+        </p:nvSpPr>
+        <p:spPr>
+          <a:xfrm>
+            <a:off x="622534" y="4470173"/>
+            <a:ext cx="822666" cy="317481"/>
+          </a:xfrm>
+          <a:prstGeom prst="roundRect">
+            <a:avLst/>
+          </a:prstGeom>
+        </p:spPr>
+        <p:style>
+          <a:lnRef idx="1">
+            <a:schemeClr val="accent2"/>
+          </a:lnRef>
+          <a:fillRef idx="2">
+            <a:schemeClr val="accent2"/>
+          </a:fillRef>
+          <a:effectRef idx="1">
+            <a:schemeClr val="accent2"/>
+          </a:effectRef>
+          <a:fontRef idx="minor">
+            <a:schemeClr val="dk1"/>
+          </a:fontRef>
+        </p:style>
+        <p:txBody>
+          <a:bodyPr rtlCol="0" anchor="ctr"/>
+          <a:lstStyle/>
+          <a:p>
+            <a:pPr algn="ctr"/>
+            <a:r>
+              <a:rPr lang="en-US" sz="2200" dirty="0">
+                <a:latin typeface="Times New Roman" panose="02020603050405020304" pitchFamily="18" charset="0"/>
+                <a:cs typeface="Times New Roman" panose="02020603050405020304" pitchFamily="18" charset="0"/>
+              </a:rPr>
+              <a:t>T12</a:t>
+            </a:r>
+          </a:p>
+        </p:txBody>
+      </p:sp>
+      <p:sp>
+        <p:nvSpPr>
+          <p:cNvPr id="18" name="Rectangle: Rounded Corners 17">
+            <a:extLst>
+              <a:ext uri="{FF2B5EF4-FFF2-40B4-BE49-F238E27FC236}">
+                <a16:creationId xmlns:a16="http://schemas.microsoft.com/office/drawing/2014/main" id="{D4C0C140-BC70-4E46-9AF5-887C675EF650}"/>
+              </a:ext>
+            </a:extLst>
+          </p:cNvPr>
+          <p:cNvSpPr/>
+          <p:nvPr/>
+        </p:nvSpPr>
+        <p:spPr>
+          <a:xfrm>
+            <a:off x="636230" y="3296185"/>
+            <a:ext cx="822666" cy="317481"/>
+          </a:xfrm>
+          <a:prstGeom prst="roundRect">
+            <a:avLst/>
+          </a:prstGeom>
+        </p:spPr>
+        <p:style>
+          <a:lnRef idx="1">
+            <a:schemeClr val="accent2"/>
+          </a:lnRef>
+          <a:fillRef idx="2">
+            <a:schemeClr val="accent2"/>
+          </a:fillRef>
+          <a:effectRef idx="1">
+            <a:schemeClr val="accent2"/>
+          </a:effectRef>
+          <a:fontRef idx="minor">
+            <a:schemeClr val="dk1"/>
+          </a:fontRef>
+        </p:style>
+        <p:txBody>
+          <a:bodyPr rtlCol="0" anchor="ctr"/>
+          <a:lstStyle/>
+          <a:p>
+            <a:pPr algn="ctr"/>
+            <a:r>
+              <a:rPr lang="en-US" sz="2200" dirty="0">
+                <a:latin typeface="Times New Roman" panose="02020603050405020304" pitchFamily="18" charset="0"/>
+                <a:cs typeface="Times New Roman" panose="02020603050405020304" pitchFamily="18" charset="0"/>
+              </a:rPr>
+              <a:t>T2</a:t>
+            </a:r>
+          </a:p>
+        </p:txBody>
+      </p:sp>
+      <p:sp>
+        <p:nvSpPr>
+          <p:cNvPr id="20" name="Rectangle: Rounded Corners 19">
+            <a:extLst>
+              <a:ext uri="{FF2B5EF4-FFF2-40B4-BE49-F238E27FC236}">
+                <a16:creationId xmlns:a16="http://schemas.microsoft.com/office/drawing/2014/main" id="{C8A60D8D-6391-4151-9D6E-3775A78EDF29}"/>
+              </a:ext>
+            </a:extLst>
+          </p:cNvPr>
+          <p:cNvSpPr/>
+          <p:nvPr/>
+        </p:nvSpPr>
+        <p:spPr>
+          <a:xfrm>
+            <a:off x="6021329" y="3572151"/>
+            <a:ext cx="1952249" cy="558000"/>
+          </a:xfrm>
+          <a:prstGeom prst="roundRect">
+            <a:avLst/>
+          </a:prstGeom>
+        </p:spPr>
+        <p:style>
+          <a:lnRef idx="1">
+            <a:schemeClr val="accent4"/>
+          </a:lnRef>
+          <a:fillRef idx="2">
+            <a:schemeClr val="accent4"/>
+          </a:fillRef>
+          <a:effectRef idx="1">
+            <a:schemeClr val="accent4"/>
+          </a:effectRef>
+          <a:fontRef idx="minor">
+            <a:schemeClr val="dk1"/>
+          </a:fontRef>
+        </p:style>
+        <p:txBody>
+          <a:bodyPr rtlCol="0" anchor="ctr"/>
+          <a:lstStyle/>
+          <a:p>
+            <a:pPr algn="ctr"/>
+            <a:r>
+              <a:rPr lang="en-US" sz="2200" dirty="0">
+                <a:latin typeface="Times New Roman" panose="02020603050405020304" pitchFamily="18" charset="0"/>
+                <a:cs typeface="Times New Roman" panose="02020603050405020304" pitchFamily="18" charset="0"/>
+              </a:rPr>
+              <a:t>Classification</a:t>
+            </a:r>
+          </a:p>
+        </p:txBody>
+      </p:sp>
+      <p:sp>
+        <p:nvSpPr>
+          <p:cNvPr id="24" name="Rectangle: Rounded Corners 23">
+            <a:extLst>
+              <a:ext uri="{FF2B5EF4-FFF2-40B4-BE49-F238E27FC236}">
+                <a16:creationId xmlns:a16="http://schemas.microsoft.com/office/drawing/2014/main" id="{72103621-F962-4E30-A0C8-9885E7FB5839}"/>
+              </a:ext>
+            </a:extLst>
+          </p:cNvPr>
+          <p:cNvSpPr/>
+          <p:nvPr/>
+        </p:nvSpPr>
+        <p:spPr>
+          <a:xfrm>
+            <a:off x="9070569" y="3572151"/>
+            <a:ext cx="2632073" cy="558000"/>
+          </a:xfrm>
+          <a:prstGeom prst="roundRect">
+            <a:avLst/>
+          </a:prstGeom>
+        </p:spPr>
+        <p:style>
+          <a:lnRef idx="1">
+            <a:schemeClr val="accent6"/>
+          </a:lnRef>
+          <a:fillRef idx="2">
+            <a:schemeClr val="accent6"/>
+          </a:fillRef>
+          <a:effectRef idx="1">
+            <a:schemeClr val="accent6"/>
+          </a:effectRef>
+          <a:fontRef idx="minor">
+            <a:schemeClr val="dk1"/>
+          </a:fontRef>
+        </p:style>
+        <p:txBody>
+          <a:bodyPr rtlCol="0" anchor="ctr"/>
+          <a:lstStyle/>
+          <a:p>
+            <a:pPr algn="ctr"/>
+            <a:r>
+              <a:rPr lang="en-US" sz="2200" dirty="0">
+                <a:latin typeface="Times New Roman" panose="02020603050405020304" pitchFamily="18" charset="0"/>
+                <a:cs typeface="Times New Roman" panose="02020603050405020304" pitchFamily="18" charset="0"/>
+              </a:rPr>
+              <a:t>Classification Result</a:t>
+            </a:r>
+          </a:p>
+        </p:txBody>
+      </p:sp>
+      <p:sp>
+        <p:nvSpPr>
+          <p:cNvPr id="5" name="TextBox 4">
+            <a:extLst>
+              <a:ext uri="{FF2B5EF4-FFF2-40B4-BE49-F238E27FC236}">
+                <a16:creationId xmlns:a16="http://schemas.microsoft.com/office/drawing/2014/main" id="{DCAF18CD-1338-4B2C-834F-99B04EF2E3DE}"/>
+              </a:ext>
+            </a:extLst>
+          </p:cNvPr>
+          <p:cNvSpPr txBox="1"/>
+          <p:nvPr/>
+        </p:nvSpPr>
+        <p:spPr>
+          <a:xfrm>
+            <a:off x="867359" y="3787354"/>
+            <a:ext cx="677108" cy="466725"/>
+          </a:xfrm>
+          <a:prstGeom prst="rect">
+            <a:avLst/>
+          </a:prstGeom>
+          <a:noFill/>
+        </p:spPr>
+        <p:txBody>
+          <a:bodyPr vert="eaVert" wrap="square" rtlCol="0">
+            <a:spAutoFit/>
+          </a:bodyPr>
+          <a:lstStyle/>
+          <a:p>
+            <a:pPr algn="ctr"/>
+            <a:r>
+              <a:rPr lang="en-US" sz="3200" dirty="0"/>
+              <a:t>…</a:t>
+            </a:r>
+          </a:p>
+        </p:txBody>
+      </p:sp>
+      <p:sp>
+        <p:nvSpPr>
+          <p:cNvPr id="6" name="Right Brace 5">
+            <a:extLst>
+              <a:ext uri="{FF2B5EF4-FFF2-40B4-BE49-F238E27FC236}">
+                <a16:creationId xmlns:a16="http://schemas.microsoft.com/office/drawing/2014/main" id="{9F6AF632-7543-47DA-BD7B-D6320A870B9E}"/>
+              </a:ext>
+            </a:extLst>
+          </p:cNvPr>
+          <p:cNvSpPr/>
+          <p:nvPr/>
+        </p:nvSpPr>
+        <p:spPr>
+          <a:xfrm>
+            <a:off x="1558238" y="2837941"/>
+            <a:ext cx="360209" cy="2017580"/>
+          </a:xfrm>
+          <a:prstGeom prst="rightBrace">
+            <a:avLst>
+              <a:gd name="adj1" fmla="val 110805"/>
+              <a:gd name="adj2" fmla="val 50000"/>
+            </a:avLst>
+          </a:prstGeom>
+          <a:ln w="19050"/>
+        </p:spPr>
+        <p:style>
+          <a:lnRef idx="1">
+            <a:schemeClr val="accent2"/>
+          </a:lnRef>
+          <a:fillRef idx="0">
+            <a:schemeClr val="accent2"/>
+          </a:fillRef>
+          <a:effectRef idx="0">
+            <a:schemeClr val="accent2"/>
+          </a:effectRef>
+          <a:fontRef idx="minor">
+            <a:schemeClr val="tx1"/>
+          </a:fontRef>
+        </p:style>
+        <p:txBody>
+          <a:bodyPr rtlCol="0" anchor="ctr"/>
+          <a:lstStyle/>
+          <a:p>
+            <a:pPr algn="ctr"/>
+            <a:endParaRPr lang="en-US"/>
+          </a:p>
+        </p:txBody>
+      </p:sp>
+      <p:cxnSp>
+        <p:nvCxnSpPr>
+          <p:cNvPr id="8" name="Straight Arrow Connector 7">
+            <a:extLst>
+              <a:ext uri="{FF2B5EF4-FFF2-40B4-BE49-F238E27FC236}">
+                <a16:creationId xmlns:a16="http://schemas.microsoft.com/office/drawing/2014/main" id="{329A6707-4D55-4F40-9127-57DFDBFD56B4}"/>
+              </a:ext>
+            </a:extLst>
+          </p:cNvPr>
+          <p:cNvCxnSpPr>
+            <a:cxnSpLocks/>
+            <a:stCxn id="15" idx="3"/>
+            <a:endCxn id="20" idx="1"/>
+          </p:cNvCxnSpPr>
+          <p:nvPr/>
+        </p:nvCxnSpPr>
+        <p:spPr>
+          <a:xfrm flipV="1">
+            <a:off x="4924339" y="3851151"/>
+            <a:ext cx="1096990" cy="824"/>
+          </a:xfrm>
+          <a:prstGeom prst="straightConnector1">
+            <a:avLst/>
+          </a:prstGeom>
+          <a:ln w="38100">
+            <a:solidFill>
+              <a:schemeClr val="tx1"/>
+            </a:solidFill>
+            <a:tailEnd type="triangle"/>
+          </a:ln>
+        </p:spPr>
+        <p:style>
+          <a:lnRef idx="1">
+            <a:schemeClr val="accent1"/>
+          </a:lnRef>
+          <a:fillRef idx="0">
+            <a:schemeClr val="accent1"/>
+          </a:fillRef>
+          <a:effectRef idx="0">
+            <a:schemeClr val="accent1"/>
+          </a:effectRef>
+          <a:fontRef idx="minor">
+            <a:schemeClr val="tx1"/>
+          </a:fontRef>
+        </p:style>
+      </p:cxnSp>
+      <p:cxnSp>
+        <p:nvCxnSpPr>
+          <p:cNvPr id="30" name="Straight Arrow Connector 29">
+            <a:extLst>
+              <a:ext uri="{FF2B5EF4-FFF2-40B4-BE49-F238E27FC236}">
+                <a16:creationId xmlns:a16="http://schemas.microsoft.com/office/drawing/2014/main" id="{9FBA1147-987A-4E8C-8939-1AA3C9A65563}"/>
+              </a:ext>
+            </a:extLst>
+          </p:cNvPr>
+          <p:cNvCxnSpPr>
+            <a:cxnSpLocks/>
+            <a:stCxn id="20" idx="3"/>
+            <a:endCxn id="24" idx="1"/>
+          </p:cNvCxnSpPr>
+          <p:nvPr/>
+        </p:nvCxnSpPr>
+        <p:spPr>
+          <a:xfrm>
+            <a:off x="7973578" y="3851151"/>
+            <a:ext cx="1096991" cy="0"/>
+          </a:xfrm>
+          <a:prstGeom prst="straightConnector1">
+            <a:avLst/>
+          </a:prstGeom>
+          <a:ln w="38100">
+            <a:solidFill>
+              <a:schemeClr val="tx1"/>
+            </a:solidFill>
+            <a:tailEnd type="triangle"/>
+          </a:ln>
+        </p:spPr>
+        <p:style>
+          <a:lnRef idx="1">
+            <a:schemeClr val="accent1"/>
+          </a:lnRef>
+          <a:fillRef idx="0">
+            <a:schemeClr val="accent1"/>
+          </a:fillRef>
+          <a:effectRef idx="0">
+            <a:schemeClr val="accent1"/>
+          </a:effectRef>
+          <a:fontRef idx="minor">
+            <a:schemeClr val="tx1"/>
+          </a:fontRef>
+        </p:style>
+      </p:cxnSp>
+      <p:sp>
+        <p:nvSpPr>
+          <p:cNvPr id="49" name="TextBox 48">
+            <a:extLst>
+              <a:ext uri="{FF2B5EF4-FFF2-40B4-BE49-F238E27FC236}">
+                <a16:creationId xmlns:a16="http://schemas.microsoft.com/office/drawing/2014/main" id="{10FA08C2-DD7C-43F2-9FF2-4844EBCB59B9}"/>
+              </a:ext>
+            </a:extLst>
+          </p:cNvPr>
+          <p:cNvSpPr txBox="1"/>
+          <p:nvPr/>
+        </p:nvSpPr>
+        <p:spPr>
+          <a:xfrm>
+            <a:off x="4811241" y="3225182"/>
+            <a:ext cx="1441459" cy="369332"/>
+          </a:xfrm>
+          <a:prstGeom prst="rect">
+            <a:avLst/>
+          </a:prstGeom>
+          <a:noFill/>
+        </p:spPr>
+        <p:txBody>
+          <a:bodyPr wrap="square" rtlCol="0">
+            <a:spAutoFit/>
+          </a:bodyPr>
+          <a:lstStyle/>
+          <a:p>
+            <a:r>
+              <a:rPr lang="en-US" dirty="0">
+                <a:latin typeface="Times New Roman" panose="02020603050405020304" pitchFamily="18" charset="0"/>
+                <a:cs typeface="Times New Roman" panose="02020603050405020304" pitchFamily="18" charset="0"/>
+              </a:rPr>
+              <a:t>Spectrogram</a:t>
+            </a:r>
+          </a:p>
+        </p:txBody>
+      </p:sp>
+      <p:sp>
+        <p:nvSpPr>
+          <p:cNvPr id="52" name="Right Brace 51">
+            <a:extLst>
+              <a:ext uri="{FF2B5EF4-FFF2-40B4-BE49-F238E27FC236}">
+                <a16:creationId xmlns:a16="http://schemas.microsoft.com/office/drawing/2014/main" id="{E58D57AF-472E-4F77-9693-B757D90077A0}"/>
+              </a:ext>
+            </a:extLst>
+          </p:cNvPr>
+          <p:cNvSpPr/>
+          <p:nvPr/>
+        </p:nvSpPr>
+        <p:spPr>
+          <a:xfrm rot="16200000">
+            <a:off x="6794973" y="3487130"/>
+            <a:ext cx="360209" cy="1758154"/>
+          </a:xfrm>
+          <a:prstGeom prst="rightBrace">
+            <a:avLst/>
+          </a:prstGeom>
+          <a:ln w="12700"/>
+        </p:spPr>
+        <p:style>
+          <a:lnRef idx="1">
+            <a:schemeClr val="accent4"/>
+          </a:lnRef>
+          <a:fillRef idx="0">
+            <a:schemeClr val="accent4"/>
+          </a:fillRef>
+          <a:effectRef idx="0">
+            <a:schemeClr val="accent4"/>
+          </a:effectRef>
+          <a:fontRef idx="minor">
+            <a:schemeClr val="tx1"/>
+          </a:fontRef>
+        </p:style>
+        <p:txBody>
+          <a:bodyPr rtlCol="0" anchor="ctr"/>
+          <a:lstStyle/>
+          <a:p>
+            <a:pPr algn="ctr"/>
+            <a:endParaRPr lang="en-US"/>
+          </a:p>
+        </p:txBody>
+      </p:sp>
+      <p:cxnSp>
+        <p:nvCxnSpPr>
+          <p:cNvPr id="53" name="Straight Arrow Connector 52">
+            <a:extLst>
+              <a:ext uri="{FF2B5EF4-FFF2-40B4-BE49-F238E27FC236}">
+                <a16:creationId xmlns:a16="http://schemas.microsoft.com/office/drawing/2014/main" id="{00617E58-4328-4AB3-A1D8-4A72286CFFCD}"/>
+              </a:ext>
+            </a:extLst>
+          </p:cNvPr>
+          <p:cNvCxnSpPr>
+            <a:cxnSpLocks/>
+            <a:stCxn id="6" idx="1"/>
+            <a:endCxn id="15" idx="1"/>
+          </p:cNvCxnSpPr>
+          <p:nvPr/>
+        </p:nvCxnSpPr>
+        <p:spPr>
+          <a:xfrm>
+            <a:off x="1918447" y="3846731"/>
+            <a:ext cx="1053643" cy="5244"/>
+          </a:xfrm>
+          <a:prstGeom prst="straightConnector1">
+            <a:avLst/>
+          </a:prstGeom>
+          <a:ln w="38100">
+            <a:solidFill>
+              <a:schemeClr val="tx1"/>
+            </a:solidFill>
+            <a:tailEnd type="triangle"/>
+          </a:ln>
+        </p:spPr>
+        <p:style>
+          <a:lnRef idx="1">
+            <a:schemeClr val="accent1"/>
+          </a:lnRef>
+          <a:fillRef idx="0">
+            <a:schemeClr val="accent1"/>
+          </a:fillRef>
+          <a:effectRef idx="0">
+            <a:schemeClr val="accent1"/>
+          </a:effectRef>
+          <a:fontRef idx="minor">
+            <a:schemeClr val="tx1"/>
+          </a:fontRef>
+        </p:style>
+      </p:cxnSp>
+      <p:sp>
+        <p:nvSpPr>
+          <p:cNvPr id="58" name="Right Brace 57">
+            <a:extLst>
+              <a:ext uri="{FF2B5EF4-FFF2-40B4-BE49-F238E27FC236}">
+                <a16:creationId xmlns:a16="http://schemas.microsoft.com/office/drawing/2014/main" id="{80A7372D-B3FC-4132-8E78-A19C5259AA7F}"/>
+              </a:ext>
+            </a:extLst>
+          </p:cNvPr>
+          <p:cNvSpPr/>
+          <p:nvPr/>
+        </p:nvSpPr>
+        <p:spPr>
+          <a:xfrm rot="16200000">
+            <a:off x="3730525" y="3481047"/>
+            <a:ext cx="360209" cy="1758154"/>
+          </a:xfrm>
+          <a:prstGeom prst="rightBrace">
+            <a:avLst/>
+          </a:prstGeom>
+          <a:ln w="12700"/>
+        </p:spPr>
+        <p:style>
+          <a:lnRef idx="1">
+            <a:schemeClr val="accent5"/>
+          </a:lnRef>
+          <a:fillRef idx="0">
+            <a:schemeClr val="accent5"/>
+          </a:fillRef>
+          <a:effectRef idx="0">
+            <a:schemeClr val="accent5"/>
+          </a:effectRef>
+          <a:fontRef idx="minor">
+            <a:schemeClr val="tx1"/>
+          </a:fontRef>
+        </p:style>
+        <p:txBody>
+          <a:bodyPr rtlCol="0" anchor="ctr"/>
+          <a:lstStyle/>
+          <a:p>
+            <a:pPr algn="ctr"/>
+            <a:endParaRPr lang="en-US"/>
+          </a:p>
+        </p:txBody>
+      </p:sp>
+      <p:sp>
+        <p:nvSpPr>
+          <p:cNvPr id="59" name="TextBox 58">
+            <a:extLst>
+              <a:ext uri="{FF2B5EF4-FFF2-40B4-BE49-F238E27FC236}">
+                <a16:creationId xmlns:a16="http://schemas.microsoft.com/office/drawing/2014/main" id="{CA530FE4-400B-4546-9416-20B53D6711CE}"/>
+              </a:ext>
+            </a:extLst>
+          </p:cNvPr>
+          <p:cNvSpPr txBox="1"/>
+          <p:nvPr/>
+        </p:nvSpPr>
+        <p:spPr>
+          <a:xfrm>
+            <a:off x="1948177" y="3244334"/>
+            <a:ext cx="1053644" cy="369332"/>
+          </a:xfrm>
+          <a:prstGeom prst="rect">
+            <a:avLst/>
+          </a:prstGeom>
+          <a:noFill/>
+        </p:spPr>
+        <p:txBody>
+          <a:bodyPr wrap="square" rtlCol="0">
+            <a:spAutoFit/>
+          </a:bodyPr>
+          <a:lstStyle/>
+          <a:p>
+            <a:r>
+              <a:rPr lang="en-US" dirty="0">
+                <a:latin typeface="Times New Roman" panose="02020603050405020304" pitchFamily="18" charset="0"/>
+                <a:cs typeface="Times New Roman" panose="02020603050405020304" pitchFamily="18" charset="0"/>
+              </a:rPr>
+              <a:t>1D data</a:t>
+            </a:r>
+          </a:p>
+        </p:txBody>
+      </p:sp>
+      <p:sp>
+        <p:nvSpPr>
+          <p:cNvPr id="60" name="TextBox 59">
+            <a:extLst>
+              <a:ext uri="{FF2B5EF4-FFF2-40B4-BE49-F238E27FC236}">
+                <a16:creationId xmlns:a16="http://schemas.microsoft.com/office/drawing/2014/main" id="{7BE39C0C-B827-458B-881D-E9B09D8EB856}"/>
+              </a:ext>
+            </a:extLst>
+          </p:cNvPr>
+          <p:cNvSpPr txBox="1"/>
+          <p:nvPr/>
+        </p:nvSpPr>
+        <p:spPr>
+          <a:xfrm>
+            <a:off x="2916243" y="4622456"/>
+            <a:ext cx="1873463" cy="1446550"/>
+          </a:xfrm>
+          <a:prstGeom prst="rect">
+            <a:avLst/>
+          </a:prstGeom>
+          <a:noFill/>
+        </p:spPr>
+        <p:txBody>
+          <a:bodyPr wrap="square" rtlCol="0">
+            <a:spAutoFit/>
+          </a:bodyPr>
+          <a:lstStyle/>
+          <a:p>
+            <a:pPr algn="ctr"/>
+            <a:r>
+              <a:rPr lang="en-US" sz="2200" dirty="0">
+                <a:latin typeface="Times New Roman" panose="02020603050405020304" pitchFamily="18" charset="0"/>
+                <a:cs typeface="Times New Roman" panose="02020603050405020304" pitchFamily="18" charset="0"/>
+              </a:rPr>
+              <a:t>1D to 2D conversion</a:t>
+            </a:r>
+          </a:p>
+          <a:p>
+            <a:pPr algn="ctr"/>
+            <a:r>
+              <a:rPr lang="en-US" sz="2200" dirty="0">
+                <a:latin typeface="Times New Roman" panose="02020603050405020304" pitchFamily="18" charset="0"/>
+                <a:cs typeface="Times New Roman" panose="02020603050405020304" pitchFamily="18" charset="0"/>
+              </a:rPr>
+              <a:t>+</a:t>
+            </a:r>
+          </a:p>
+          <a:p>
+            <a:pPr algn="ctr"/>
+            <a:r>
+              <a:rPr lang="en-US" sz="2200" dirty="0">
+                <a:latin typeface="Times New Roman" panose="02020603050405020304" pitchFamily="18" charset="0"/>
+                <a:cs typeface="Times New Roman" panose="02020603050405020304" pitchFamily="18" charset="0"/>
+              </a:rPr>
+              <a:t>STFT</a:t>
+            </a:r>
+          </a:p>
+        </p:txBody>
+      </p:sp>
+      <p:sp>
+        <p:nvSpPr>
+          <p:cNvPr id="61" name="TextBox 60">
+            <a:extLst>
+              <a:ext uri="{FF2B5EF4-FFF2-40B4-BE49-F238E27FC236}">
+                <a16:creationId xmlns:a16="http://schemas.microsoft.com/office/drawing/2014/main" id="{F7546269-029E-43D2-A35A-783981297618}"/>
+              </a:ext>
+            </a:extLst>
+          </p:cNvPr>
+          <p:cNvSpPr txBox="1"/>
+          <p:nvPr/>
+        </p:nvSpPr>
+        <p:spPr>
+          <a:xfrm>
+            <a:off x="6021329" y="4599037"/>
+            <a:ext cx="1873463" cy="769441"/>
+          </a:xfrm>
+          <a:prstGeom prst="rect">
+            <a:avLst/>
+          </a:prstGeom>
+          <a:noFill/>
+        </p:spPr>
+        <p:txBody>
+          <a:bodyPr wrap="square" rtlCol="0">
+            <a:spAutoFit/>
+          </a:bodyPr>
+          <a:lstStyle/>
+          <a:p>
+            <a:pPr algn="ctr"/>
+            <a:r>
+              <a:rPr lang="en-US" sz="2200" dirty="0">
+                <a:latin typeface="Times New Roman" panose="02020603050405020304" pitchFamily="18" charset="0"/>
+                <a:cs typeface="Times New Roman" panose="02020603050405020304" pitchFamily="18" charset="0"/>
+              </a:rPr>
+              <a:t>Classify using trained model</a:t>
+            </a:r>
           </a:p>
         </p:txBody>
       </p:sp>
     </p:spTree>
     <p:extLst>
       <p:ext uri="{BB962C8B-B14F-4D97-AF65-F5344CB8AC3E}">
-        <p14:creationId xmlns:p14="http://schemas.microsoft.com/office/powerpoint/2010/main" val="4167302775"/>
+        <p14:creationId xmlns:p14="http://schemas.microsoft.com/office/powerpoint/2010/main" val="3271558478"/>
       </p:ext>
     </p:extLst>
   </p:cSld>
@@ -8556,7 +9347,7 @@
           <p:cNvPr id="9" name="TextBox 8">
             <a:extLst>
               <a:ext uri="{FF2B5EF4-FFF2-40B4-BE49-F238E27FC236}">
-                <a16:creationId xmlns:a16="http://schemas.microsoft.com/office/drawing/2014/main" id="{39A9DCD3-F794-4C45-8A7D-CD57CBEEE291}"/>
+                <a16:creationId xmlns:a16="http://schemas.microsoft.com/office/drawing/2014/main" id="{EF386AD6-4AFA-42FA-AAE8-E232F7B0FC08}"/>
               </a:ext>
             </a:extLst>
           </p:cNvPr>
@@ -8599,17 +9390,17 @@
                 <a:ea typeface="+mj-ea"/>
                 <a:cs typeface="Times New Roman" panose="02020603050405020304" pitchFamily="18" charset="0"/>
               </a:rPr>
-              <a:t>Conclusion</a:t>
+              <a:t>Experiment Result</a:t>
             </a:r>
           </a:p>
         </p:txBody>
       </p:sp>
       <p:sp>
         <p:nvSpPr>
-          <p:cNvPr id="10" name="TextBox 9">
-            <a:extLst>
-              <a:ext uri="{FF2B5EF4-FFF2-40B4-BE49-F238E27FC236}">
-                <a16:creationId xmlns:a16="http://schemas.microsoft.com/office/drawing/2014/main" id="{3E2366B4-DA4C-41BE-83B1-CFB5B8ABECD9}"/>
+          <p:cNvPr id="11" name="TextBox 10">
+            <a:extLst>
+              <a:ext uri="{FF2B5EF4-FFF2-40B4-BE49-F238E27FC236}">
+                <a16:creationId xmlns:a16="http://schemas.microsoft.com/office/drawing/2014/main" id="{7CE3E37A-D160-4280-8C8A-C86CC66F42FE}"/>
               </a:ext>
             </a:extLst>
           </p:cNvPr>
@@ -8618,8 +9409,8 @@
         </p:nvSpPr>
         <p:spPr>
           <a:xfrm>
-            <a:off x="643468" y="1782981"/>
-            <a:ext cx="6842935" cy="4393982"/>
+            <a:off x="670705" y="1254141"/>
+            <a:ext cx="4949919" cy="1229973"/>
           </a:xfrm>
           <a:prstGeom prst="rect">
             <a:avLst/>
@@ -8627,11 +9418,11 @@
         </p:spPr>
         <p:txBody>
           <a:bodyPr vert="horz" lIns="91440" tIns="45720" rIns="91440" bIns="45720" rtlCol="0">
-            <a:normAutofit/>
+            <a:noAutofit/>
           </a:bodyPr>
           <a:lstStyle/>
           <a:p>
-            <a:pPr indent="-228600">
+            <a:pPr>
               <a:lnSpc>
                 <a:spcPct val="90000"/>
               </a:lnSpc>
@@ -8641,19 +9432,17 @@
               <a:buClr>
                 <a:schemeClr val="accent1"/>
               </a:buClr>
-              <a:buFont typeface="Arial" panose="020B0604020202020204" pitchFamily="34" charset="0"/>
-              <a:buChar char="•"/>
             </a:pPr>
             <a:r>
               <a:rPr lang="en-US" sz="2200" dirty="0">
                 <a:latin typeface="Times New Roman" panose="02020603050405020304" pitchFamily="18" charset="0"/>
                 <a:cs typeface="Times New Roman" panose="02020603050405020304" pitchFamily="18" charset="0"/>
               </a:rPr>
-              <a:t>Font : Times New Roman size 22</a:t>
+              <a:t>There are two parts in experiment results.</a:t>
             </a:r>
           </a:p>
           <a:p>
-            <a:pPr indent="-228600">
+            <a:pPr marL="457200" indent="-457200">
               <a:lnSpc>
                 <a:spcPct val="90000"/>
               </a:lnSpc>
@@ -8663,20 +9452,353 @@
               <a:buClr>
                 <a:schemeClr val="accent1"/>
               </a:buClr>
-              <a:buFont typeface="Arial" panose="020B0604020202020204" pitchFamily="34" charset="0"/>
-              <a:buChar char="•"/>
+              <a:buAutoNum type="arabicPeriod"/>
             </a:pPr>
-            <a:endParaRPr lang="en-US" sz="2200" dirty="0">
-              <a:latin typeface="Times New Roman" panose="02020603050405020304" pitchFamily="18" charset="0"/>
-              <a:cs typeface="Times New Roman" panose="02020603050405020304" pitchFamily="18" charset="0"/>
-            </a:endParaRPr>
+            <a:r>
+              <a:rPr lang="en-US" sz="2200" dirty="0">
+                <a:latin typeface="Times New Roman" panose="02020603050405020304" pitchFamily="18" charset="0"/>
+                <a:cs typeface="Times New Roman" panose="02020603050405020304" pitchFamily="18" charset="0"/>
+              </a:rPr>
+              <a:t>Evaluation of trained CNN model</a:t>
+            </a:r>
+          </a:p>
+        </p:txBody>
+      </p:sp>
+      <p:graphicFrame>
+        <p:nvGraphicFramePr>
+          <p:cNvPr id="2" name="Table 2">
+            <a:extLst>
+              <a:ext uri="{FF2B5EF4-FFF2-40B4-BE49-F238E27FC236}">
+                <a16:creationId xmlns:a16="http://schemas.microsoft.com/office/drawing/2014/main" id="{B8BC7B6C-4033-42EA-AE54-42D60C903AFA}"/>
+              </a:ext>
+            </a:extLst>
+          </p:cNvPr>
+          <p:cNvGraphicFramePr>
+            <a:graphicFrameLocks noGrp="1"/>
+          </p:cNvGraphicFramePr>
+          <p:nvPr>
+            <p:extLst>
+              <p:ext uri="{D42A27DB-BD31-4B8C-83A1-F6EECF244321}">
+                <p14:modId xmlns:p14="http://schemas.microsoft.com/office/powerpoint/2010/main" val="1636750722"/>
+              </p:ext>
+            </p:extLst>
+          </p:nvPr>
+        </p:nvGraphicFramePr>
+        <p:xfrm>
+          <a:off x="3699686" y="3032581"/>
+          <a:ext cx="4293300" cy="2271570"/>
+        </p:xfrm>
+        <a:graphic>
+          <a:graphicData uri="http://schemas.openxmlformats.org/drawingml/2006/table">
+            <a:tbl>
+              <a:tblPr firstRow="1" bandRow="1">
+                <a:tableStyleId>{3B4B98B0-60AC-42C2-AFA5-B58CD77FA1E5}</a:tableStyleId>
+              </a:tblPr>
+              <a:tblGrid>
+                <a:gridCol w="2146650">
+                  <a:extLst>
+                    <a:ext uri="{9D8B030D-6E8A-4147-A177-3AD203B41FA5}">
+                      <a16:colId xmlns:a16="http://schemas.microsoft.com/office/drawing/2014/main" val="3477120861"/>
+                    </a:ext>
+                  </a:extLst>
+                </a:gridCol>
+                <a:gridCol w="2146650">
+                  <a:extLst>
+                    <a:ext uri="{9D8B030D-6E8A-4147-A177-3AD203B41FA5}">
+                      <a16:colId xmlns:a16="http://schemas.microsoft.com/office/drawing/2014/main" val="2758611918"/>
+                    </a:ext>
+                  </a:extLst>
+                </a:gridCol>
+              </a:tblGrid>
+              <a:tr h="454314">
+                <a:tc>
+                  <a:txBody>
+                    <a:bodyPr/>
+                    <a:lstStyle/>
+                    <a:p>
+                      <a:pPr algn="ctr"/>
+                      <a:r>
+                        <a:rPr lang="en-US" sz="2200" dirty="0">
+                          <a:latin typeface="Times New Roman" panose="02020603050405020304" pitchFamily="18" charset="0"/>
+                          <a:cs typeface="Times New Roman" panose="02020603050405020304" pitchFamily="18" charset="0"/>
+                        </a:rPr>
+                        <a:t>Measurement</a:t>
+                      </a:r>
+                    </a:p>
+                  </a:txBody>
+                  <a:tcPr/>
+                </a:tc>
+                <a:tc>
+                  <a:txBody>
+                    <a:bodyPr/>
+                    <a:lstStyle/>
+                    <a:p>
+                      <a:pPr algn="ctr"/>
+                      <a:r>
+                        <a:rPr lang="en-US" sz="2200" dirty="0">
+                          <a:latin typeface="Times New Roman" panose="02020603050405020304" pitchFamily="18" charset="0"/>
+                          <a:cs typeface="Times New Roman" panose="02020603050405020304" pitchFamily="18" charset="0"/>
+                        </a:rPr>
+                        <a:t>Average Value</a:t>
+                      </a:r>
+                    </a:p>
+                  </a:txBody>
+                  <a:tcPr/>
+                </a:tc>
+                <a:extLst>
+                  <a:ext uri="{0D108BD9-81ED-4DB2-BD59-A6C34878D82A}">
+                    <a16:rowId xmlns:a16="http://schemas.microsoft.com/office/drawing/2014/main" val="2024343439"/>
+                  </a:ext>
+                </a:extLst>
+              </a:tr>
+              <a:tr h="454314">
+                <a:tc>
+                  <a:txBody>
+                    <a:bodyPr/>
+                    <a:lstStyle/>
+                    <a:p>
+                      <a:pPr algn="ctr"/>
+                      <a:r>
+                        <a:rPr lang="en-US" sz="2200" dirty="0">
+                          <a:latin typeface="Times New Roman" panose="02020603050405020304" pitchFamily="18" charset="0"/>
+                          <a:cs typeface="Times New Roman" panose="02020603050405020304" pitchFamily="18" charset="0"/>
+                        </a:rPr>
+                        <a:t>Accuracy</a:t>
+                      </a:r>
+                    </a:p>
+                  </a:txBody>
+                  <a:tcPr/>
+                </a:tc>
+                <a:tc>
+                  <a:txBody>
+                    <a:bodyPr/>
+                    <a:lstStyle/>
+                    <a:p>
+                      <a:pPr algn="ctr"/>
+                      <a:r>
+                        <a:rPr lang="en-US" sz="2200" dirty="0">
+                          <a:latin typeface="Times New Roman" panose="02020603050405020304" pitchFamily="18" charset="0"/>
+                          <a:cs typeface="Times New Roman" panose="02020603050405020304" pitchFamily="18" charset="0"/>
+                        </a:rPr>
+                        <a:t>0.879</a:t>
+                      </a:r>
+                    </a:p>
+                  </a:txBody>
+                  <a:tcPr/>
+                </a:tc>
+                <a:extLst>
+                  <a:ext uri="{0D108BD9-81ED-4DB2-BD59-A6C34878D82A}">
+                    <a16:rowId xmlns:a16="http://schemas.microsoft.com/office/drawing/2014/main" val="3449076970"/>
+                  </a:ext>
+                </a:extLst>
+              </a:tr>
+              <a:tr h="454314">
+                <a:tc>
+                  <a:txBody>
+                    <a:bodyPr/>
+                    <a:lstStyle/>
+                    <a:p>
+                      <a:pPr algn="ctr"/>
+                      <a:r>
+                        <a:rPr lang="en-US" sz="2200" dirty="0">
+                          <a:latin typeface="Times New Roman" panose="02020603050405020304" pitchFamily="18" charset="0"/>
+                          <a:cs typeface="Times New Roman" panose="02020603050405020304" pitchFamily="18" charset="0"/>
+                        </a:rPr>
+                        <a:t>Precision</a:t>
+                      </a:r>
+                    </a:p>
+                  </a:txBody>
+                  <a:tcPr/>
+                </a:tc>
+                <a:tc>
+                  <a:txBody>
+                    <a:bodyPr/>
+                    <a:lstStyle/>
+                    <a:p>
+                      <a:pPr algn="ctr"/>
+                      <a:r>
+                        <a:rPr lang="en-US" sz="2200" dirty="0">
+                          <a:latin typeface="Times New Roman" panose="02020603050405020304" pitchFamily="18" charset="0"/>
+                          <a:cs typeface="Times New Roman" panose="02020603050405020304" pitchFamily="18" charset="0"/>
+                        </a:rPr>
+                        <a:t>0.906</a:t>
+                      </a:r>
+                    </a:p>
+                  </a:txBody>
+                  <a:tcPr/>
+                </a:tc>
+                <a:extLst>
+                  <a:ext uri="{0D108BD9-81ED-4DB2-BD59-A6C34878D82A}">
+                    <a16:rowId xmlns:a16="http://schemas.microsoft.com/office/drawing/2014/main" val="119896400"/>
+                  </a:ext>
+                </a:extLst>
+              </a:tr>
+              <a:tr h="454314">
+                <a:tc>
+                  <a:txBody>
+                    <a:bodyPr/>
+                    <a:lstStyle/>
+                    <a:p>
+                      <a:pPr algn="ctr"/>
+                      <a:r>
+                        <a:rPr lang="en-US" sz="2200" dirty="0">
+                          <a:latin typeface="Times New Roman" panose="02020603050405020304" pitchFamily="18" charset="0"/>
+                          <a:cs typeface="Times New Roman" panose="02020603050405020304" pitchFamily="18" charset="0"/>
+                        </a:rPr>
+                        <a:t>Recall</a:t>
+                      </a:r>
+                    </a:p>
+                  </a:txBody>
+                  <a:tcPr/>
+                </a:tc>
+                <a:tc>
+                  <a:txBody>
+                    <a:bodyPr/>
+                    <a:lstStyle/>
+                    <a:p>
+                      <a:pPr algn="ctr"/>
+                      <a:r>
+                        <a:rPr lang="en-US" sz="2200" dirty="0">
+                          <a:latin typeface="Times New Roman" panose="02020603050405020304" pitchFamily="18" charset="0"/>
+                          <a:cs typeface="Times New Roman" panose="02020603050405020304" pitchFamily="18" charset="0"/>
+                        </a:rPr>
+                        <a:t>0.890</a:t>
+                      </a:r>
+                    </a:p>
+                  </a:txBody>
+                  <a:tcPr/>
+                </a:tc>
+                <a:extLst>
+                  <a:ext uri="{0D108BD9-81ED-4DB2-BD59-A6C34878D82A}">
+                    <a16:rowId xmlns:a16="http://schemas.microsoft.com/office/drawing/2014/main" val="1351258140"/>
+                  </a:ext>
+                </a:extLst>
+              </a:tr>
+              <a:tr h="454314">
+                <a:tc>
+                  <a:txBody>
+                    <a:bodyPr/>
+                    <a:lstStyle/>
+                    <a:p>
+                      <a:pPr algn="ctr"/>
+                      <a:r>
+                        <a:rPr lang="en-US" sz="2200" dirty="0">
+                          <a:latin typeface="Times New Roman" panose="02020603050405020304" pitchFamily="18" charset="0"/>
+                          <a:cs typeface="Times New Roman" panose="02020603050405020304" pitchFamily="18" charset="0"/>
+                        </a:rPr>
+                        <a:t>F1-Score</a:t>
+                      </a:r>
+                    </a:p>
+                  </a:txBody>
+                  <a:tcPr/>
+                </a:tc>
+                <a:tc>
+                  <a:txBody>
+                    <a:bodyPr/>
+                    <a:lstStyle/>
+                    <a:p>
+                      <a:pPr algn="ctr"/>
+                      <a:r>
+                        <a:rPr lang="en-US" sz="2200" dirty="0">
+                          <a:latin typeface="Times New Roman" panose="02020603050405020304" pitchFamily="18" charset="0"/>
+                          <a:cs typeface="Times New Roman" panose="02020603050405020304" pitchFamily="18" charset="0"/>
+                        </a:rPr>
+                        <a:t>0.901</a:t>
+                      </a:r>
+                    </a:p>
+                  </a:txBody>
+                  <a:tcPr/>
+                </a:tc>
+                <a:extLst>
+                  <a:ext uri="{0D108BD9-81ED-4DB2-BD59-A6C34878D82A}">
+                    <a16:rowId xmlns:a16="http://schemas.microsoft.com/office/drawing/2014/main" val="2491176557"/>
+                  </a:ext>
+                </a:extLst>
+              </a:tr>
+            </a:tbl>
+          </a:graphicData>
+        </a:graphic>
+      </p:graphicFrame>
+      <p:sp>
+        <p:nvSpPr>
+          <p:cNvPr id="3" name="TextBox 2">
+            <a:extLst>
+              <a:ext uri="{FF2B5EF4-FFF2-40B4-BE49-F238E27FC236}">
+                <a16:creationId xmlns:a16="http://schemas.microsoft.com/office/drawing/2014/main" id="{AC35400A-323D-4F92-9943-562C527F6FB5}"/>
+              </a:ext>
+            </a:extLst>
+          </p:cNvPr>
+          <p:cNvSpPr txBox="1"/>
+          <p:nvPr/>
+        </p:nvSpPr>
+        <p:spPr>
+          <a:xfrm>
+            <a:off x="3207702" y="2339256"/>
+            <a:ext cx="5698610" cy="430887"/>
+          </a:xfrm>
+          <a:prstGeom prst="rect">
+            <a:avLst/>
+          </a:prstGeom>
+          <a:noFill/>
+        </p:spPr>
+        <p:txBody>
+          <a:bodyPr wrap="square" rtlCol="0">
+            <a:spAutoFit/>
+          </a:bodyPr>
+          <a:lstStyle/>
+          <a:p>
+            <a:r>
+              <a:rPr lang="en-US" sz="2200" dirty="0">
+                <a:latin typeface="Times New Roman" panose="02020603050405020304" pitchFamily="18" charset="0"/>
+                <a:cs typeface="Times New Roman" panose="02020603050405020304" pitchFamily="18" charset="0"/>
+              </a:rPr>
+              <a:t>Table 1: Measurement of trained CNN model</a:t>
+            </a:r>
+          </a:p>
+        </p:txBody>
+      </p:sp>
+      <p:sp>
+        <p:nvSpPr>
+          <p:cNvPr id="16" name="TextBox 15">
+            <a:extLst>
+              <a:ext uri="{FF2B5EF4-FFF2-40B4-BE49-F238E27FC236}">
+                <a16:creationId xmlns:a16="http://schemas.microsoft.com/office/drawing/2014/main" id="{B28F0065-8592-4BE0-AD40-A2CFFD5AC05A}"/>
+              </a:ext>
+            </a:extLst>
+          </p:cNvPr>
+          <p:cNvSpPr txBox="1"/>
+          <p:nvPr/>
+        </p:nvSpPr>
+        <p:spPr>
+          <a:xfrm>
+            <a:off x="3207702" y="5392548"/>
+            <a:ext cx="5698610" cy="769441"/>
+          </a:xfrm>
+          <a:prstGeom prst="rect">
+            <a:avLst/>
+          </a:prstGeom>
+          <a:noFill/>
+        </p:spPr>
+        <p:txBody>
+          <a:bodyPr wrap="square" rtlCol="0">
+            <a:spAutoFit/>
+          </a:bodyPr>
+          <a:lstStyle/>
+          <a:p>
+            <a:r>
+              <a:rPr lang="en-US" sz="2200" dirty="0">
+                <a:latin typeface="Times New Roman" panose="02020603050405020304" pitchFamily="18" charset="0"/>
+                <a:cs typeface="Times New Roman" panose="02020603050405020304" pitchFamily="18" charset="0"/>
+              </a:rPr>
+              <a:t>Remarks : we conducted the experiment 100 times and find the average value.</a:t>
+            </a:r>
           </a:p>
         </p:txBody>
       </p:sp>
     </p:spTree>
     <p:extLst>
       <p:ext uri="{BB962C8B-B14F-4D97-AF65-F5344CB8AC3E}">
-        <p14:creationId xmlns:p14="http://schemas.microsoft.com/office/powerpoint/2010/main" val="1291641331"/>
+        <p14:creationId xmlns:p14="http://schemas.microsoft.com/office/powerpoint/2010/main" val="4167302775"/>
       </p:ext>
     </p:extLst>
   </p:cSld>
@@ -8686,7 +9808,7 @@
 </p:sld>
 </file>
 
-<file path=ppt/slides/slide2.xml><?xml version="1.0" encoding="utf-8"?>
+<file path=ppt/slides/slide14.xml><?xml version="1.0" encoding="utf-8"?>
 <p:sld xmlns:a="http://schemas.openxmlformats.org/drawingml/2006/main" xmlns:r="http://schemas.openxmlformats.org/officeDocument/2006/relationships" xmlns:p="http://schemas.openxmlformats.org/presentationml/2006/main">
   <p:cSld>
     <p:spTree>
@@ -9088,6 +10210,2354 @@
       </p:grpSp>
       <p:sp>
         <p:nvSpPr>
+          <p:cNvPr id="9" name="TextBox 8">
+            <a:extLst>
+              <a:ext uri="{FF2B5EF4-FFF2-40B4-BE49-F238E27FC236}">
+                <a16:creationId xmlns:a16="http://schemas.microsoft.com/office/drawing/2014/main" id="{EF386AD6-4AFA-42FA-AAE8-E232F7B0FC08}"/>
+              </a:ext>
+            </a:extLst>
+          </p:cNvPr>
+          <p:cNvSpPr txBox="1"/>
+          <p:nvPr/>
+        </p:nvSpPr>
+        <p:spPr>
+          <a:xfrm>
+            <a:off x="643467" y="321734"/>
+            <a:ext cx="10905066" cy="1135737"/>
+          </a:xfrm>
+          <a:prstGeom prst="rect">
+            <a:avLst/>
+          </a:prstGeom>
+        </p:spPr>
+        <p:txBody>
+          <a:bodyPr vert="horz" lIns="91440" tIns="45720" rIns="91440" bIns="45720" rtlCol="0" anchor="ctr">
+            <a:normAutofit/>
+          </a:bodyPr>
+          <a:lstStyle/>
+          <a:p>
+            <a:pPr>
+              <a:lnSpc>
+                <a:spcPct val="90000"/>
+              </a:lnSpc>
+              <a:spcBef>
+                <a:spcPct val="0"/>
+              </a:spcBef>
+              <a:spcAft>
+                <a:spcPts val="600"/>
+              </a:spcAft>
+            </a:pPr>
+            <a:r>
+              <a:rPr lang="en-US" sz="3300" b="1" i="0" kern="1200" spc="-50" dirty="0">
+                <a:solidFill>
+                  <a:schemeClr val="tx1"/>
+                </a:solidFill>
+                <a:effectLst/>
+                <a:latin typeface="Times New Roman" panose="02020603050405020304" pitchFamily="18" charset="0"/>
+                <a:ea typeface="+mj-ea"/>
+                <a:cs typeface="Times New Roman" panose="02020603050405020304" pitchFamily="18" charset="0"/>
+              </a:rPr>
+              <a:t>Experiment Result</a:t>
+            </a:r>
+          </a:p>
+        </p:txBody>
+      </p:sp>
+      <p:sp>
+        <p:nvSpPr>
+          <p:cNvPr id="11" name="TextBox 10">
+            <a:extLst>
+              <a:ext uri="{FF2B5EF4-FFF2-40B4-BE49-F238E27FC236}">
+                <a16:creationId xmlns:a16="http://schemas.microsoft.com/office/drawing/2014/main" id="{7CE3E37A-D160-4280-8C8A-C86CC66F42FE}"/>
+              </a:ext>
+            </a:extLst>
+          </p:cNvPr>
+          <p:cNvSpPr txBox="1"/>
+          <p:nvPr/>
+        </p:nvSpPr>
+        <p:spPr>
+          <a:xfrm>
+            <a:off x="670705" y="1254141"/>
+            <a:ext cx="4949919" cy="1229973"/>
+          </a:xfrm>
+          <a:prstGeom prst="rect">
+            <a:avLst/>
+          </a:prstGeom>
+        </p:spPr>
+        <p:txBody>
+          <a:bodyPr vert="horz" lIns="91440" tIns="45720" rIns="91440" bIns="45720" rtlCol="0">
+            <a:noAutofit/>
+          </a:bodyPr>
+          <a:lstStyle/>
+          <a:p>
+            <a:pPr marL="457200" indent="-457200">
+              <a:lnSpc>
+                <a:spcPct val="90000"/>
+              </a:lnSpc>
+              <a:spcAft>
+                <a:spcPts val="600"/>
+              </a:spcAft>
+              <a:buClr>
+                <a:schemeClr val="accent1"/>
+              </a:buClr>
+              <a:buFont typeface="+mj-lt"/>
+              <a:buAutoNum type="arabicPeriod" startAt="2"/>
+            </a:pPr>
+            <a:r>
+              <a:rPr lang="en-US" sz="2200" dirty="0">
+                <a:latin typeface="Times New Roman" panose="02020603050405020304" pitchFamily="18" charset="0"/>
+                <a:cs typeface="Times New Roman" panose="02020603050405020304" pitchFamily="18" charset="0"/>
+              </a:rPr>
+              <a:t>Classification result</a:t>
+            </a:r>
+          </a:p>
+        </p:txBody>
+      </p:sp>
+      <p:pic>
+        <p:nvPicPr>
+          <p:cNvPr id="19" name="Picture 18" descr="Chart, bar chart&#10;&#10;Description automatically generated">
+            <a:extLst>
+              <a:ext uri="{FF2B5EF4-FFF2-40B4-BE49-F238E27FC236}">
+                <a16:creationId xmlns:a16="http://schemas.microsoft.com/office/drawing/2014/main" id="{717B4285-A9EB-4E01-AE58-60BBFF026D63}"/>
+              </a:ext>
+            </a:extLst>
+          </p:cNvPr>
+          <p:cNvPicPr>
+            <a:picLocks noChangeAspect="1"/>
+          </p:cNvPicPr>
+          <p:nvPr/>
+        </p:nvPicPr>
+        <p:blipFill>
+          <a:blip r:embed="rId2">
+            <a:extLst>
+              <a:ext uri="{28A0092B-C50C-407E-A947-70E740481C1C}">
+                <a14:useLocalDpi xmlns:a14="http://schemas.microsoft.com/office/drawing/2010/main" val="0"/>
+              </a:ext>
+            </a:extLst>
+          </a:blip>
+          <a:stretch>
+            <a:fillRect/>
+          </a:stretch>
+        </p:blipFill>
+        <p:spPr>
+          <a:xfrm>
+            <a:off x="643467" y="1880690"/>
+            <a:ext cx="5426994" cy="3260136"/>
+          </a:xfrm>
+          <a:prstGeom prst="rect">
+            <a:avLst/>
+          </a:prstGeom>
+        </p:spPr>
+      </p:pic>
+      <p:graphicFrame>
+        <p:nvGraphicFramePr>
+          <p:cNvPr id="4" name="Table 4">
+            <a:extLst>
+              <a:ext uri="{FF2B5EF4-FFF2-40B4-BE49-F238E27FC236}">
+                <a16:creationId xmlns:a16="http://schemas.microsoft.com/office/drawing/2014/main" id="{CEADEFA5-DDBB-4C19-AC25-C3752DF042A5}"/>
+              </a:ext>
+            </a:extLst>
+          </p:cNvPr>
+          <p:cNvGraphicFramePr>
+            <a:graphicFrameLocks noGrp="1"/>
+          </p:cNvGraphicFramePr>
+          <p:nvPr>
+            <p:extLst>
+              <p:ext uri="{D42A27DB-BD31-4B8C-83A1-F6EECF244321}">
+                <p14:modId xmlns:p14="http://schemas.microsoft.com/office/powerpoint/2010/main" val="4099073329"/>
+              </p:ext>
+            </p:extLst>
+          </p:nvPr>
+        </p:nvGraphicFramePr>
+        <p:xfrm>
+          <a:off x="6490133" y="1246305"/>
+          <a:ext cx="4687808" cy="5068548"/>
+        </p:xfrm>
+        <a:graphic>
+          <a:graphicData uri="http://schemas.openxmlformats.org/drawingml/2006/table">
+            <a:tbl>
+              <a:tblPr firstRow="1" bandRow="1">
+                <a:tableStyleId>{3B4B98B0-60AC-42C2-AFA5-B58CD77FA1E5}</a:tableStyleId>
+              </a:tblPr>
+              <a:tblGrid>
+                <a:gridCol w="853738">
+                  <a:extLst>
+                    <a:ext uri="{9D8B030D-6E8A-4147-A177-3AD203B41FA5}">
+                      <a16:colId xmlns:a16="http://schemas.microsoft.com/office/drawing/2014/main" val="2826820058"/>
+                    </a:ext>
+                  </a:extLst>
+                </a:gridCol>
+                <a:gridCol w="1490166">
+                  <a:extLst>
+                    <a:ext uri="{9D8B030D-6E8A-4147-A177-3AD203B41FA5}">
+                      <a16:colId xmlns:a16="http://schemas.microsoft.com/office/drawing/2014/main" val="2818317887"/>
+                    </a:ext>
+                  </a:extLst>
+                </a:gridCol>
+                <a:gridCol w="1171952">
+                  <a:extLst>
+                    <a:ext uri="{9D8B030D-6E8A-4147-A177-3AD203B41FA5}">
+                      <a16:colId xmlns:a16="http://schemas.microsoft.com/office/drawing/2014/main" val="3945862744"/>
+                    </a:ext>
+                  </a:extLst>
+                </a:gridCol>
+                <a:gridCol w="1171952">
+                  <a:extLst>
+                    <a:ext uri="{9D8B030D-6E8A-4147-A177-3AD203B41FA5}">
+                      <a16:colId xmlns:a16="http://schemas.microsoft.com/office/drawing/2014/main" val="683458874"/>
+                    </a:ext>
+                  </a:extLst>
+                </a:gridCol>
+              </a:tblGrid>
+              <a:tr h="369039">
+                <a:tc>
+                  <a:txBody>
+                    <a:bodyPr/>
+                    <a:lstStyle/>
+                    <a:p>
+                      <a:pPr algn="ctr"/>
+                      <a:r>
+                        <a:rPr lang="en-US" b="0" dirty="0">
+                          <a:latin typeface="Times New Roman" panose="02020603050405020304" pitchFamily="18" charset="0"/>
+                          <a:cs typeface="Times New Roman" panose="02020603050405020304" pitchFamily="18" charset="0"/>
+                        </a:rPr>
+                        <a:t>Object</a:t>
+                      </a:r>
+                    </a:p>
+                  </a:txBody>
+                  <a:tcPr/>
+                </a:tc>
+                <a:tc>
+                  <a:txBody>
+                    <a:bodyPr/>
+                    <a:lstStyle/>
+                    <a:p>
+                      <a:pPr algn="ctr"/>
+                      <a:r>
+                        <a:rPr lang="en-US" b="0" dirty="0">
+                          <a:latin typeface="Times New Roman" panose="02020603050405020304" pitchFamily="18" charset="0"/>
+                          <a:cs typeface="Times New Roman" panose="02020603050405020304" pitchFamily="18" charset="0"/>
+                        </a:rPr>
+                        <a:t>Classified </a:t>
+                      </a:r>
+                    </a:p>
+                    <a:p>
+                      <a:pPr algn="ctr"/>
+                      <a:r>
+                        <a:rPr lang="en-US" b="0" dirty="0">
+                          <a:latin typeface="Times New Roman" panose="02020603050405020304" pitchFamily="18" charset="0"/>
+                          <a:cs typeface="Times New Roman" panose="02020603050405020304" pitchFamily="18" charset="0"/>
+                        </a:rPr>
+                        <a:t>as Obj 1  </a:t>
+                      </a:r>
+                    </a:p>
+                  </a:txBody>
+                  <a:tcPr/>
+                </a:tc>
+                <a:tc>
+                  <a:txBody>
+                    <a:bodyPr/>
+                    <a:lstStyle/>
+                    <a:p>
+                      <a:pPr marL="0" marR="0" lvl="0" indent="0" algn="ctr" defTabSz="914400" rtl="0" eaLnBrk="1" fontAlgn="auto" latinLnBrk="0" hangingPunct="1">
+                        <a:lnSpc>
+                          <a:spcPct val="100000"/>
+                        </a:lnSpc>
+                        <a:spcBef>
+                          <a:spcPts val="0"/>
+                        </a:spcBef>
+                        <a:spcAft>
+                          <a:spcPts val="0"/>
+                        </a:spcAft>
+                        <a:buClrTx/>
+                        <a:buSzTx/>
+                        <a:buFontTx/>
+                        <a:buNone/>
+                        <a:tabLst/>
+                        <a:defRPr/>
+                      </a:pPr>
+                      <a:r>
+                        <a:rPr lang="en-US" b="0" dirty="0">
+                          <a:latin typeface="Times New Roman" panose="02020603050405020304" pitchFamily="18" charset="0"/>
+                          <a:cs typeface="Times New Roman" panose="02020603050405020304" pitchFamily="18" charset="0"/>
+                        </a:rPr>
+                        <a:t>Classified </a:t>
+                      </a:r>
+                    </a:p>
+                    <a:p>
+                      <a:pPr marL="0" marR="0" lvl="0" indent="0" algn="ctr" defTabSz="914400" rtl="0" eaLnBrk="1" fontAlgn="auto" latinLnBrk="0" hangingPunct="1">
+                        <a:lnSpc>
+                          <a:spcPct val="100000"/>
+                        </a:lnSpc>
+                        <a:spcBef>
+                          <a:spcPts val="0"/>
+                        </a:spcBef>
+                        <a:spcAft>
+                          <a:spcPts val="0"/>
+                        </a:spcAft>
+                        <a:buClrTx/>
+                        <a:buSzTx/>
+                        <a:buFontTx/>
+                        <a:buNone/>
+                        <a:tabLst/>
+                        <a:defRPr/>
+                      </a:pPr>
+                      <a:r>
+                        <a:rPr lang="en-US" b="0" dirty="0">
+                          <a:latin typeface="Times New Roman" panose="02020603050405020304" pitchFamily="18" charset="0"/>
+                          <a:cs typeface="Times New Roman" panose="02020603050405020304" pitchFamily="18" charset="0"/>
+                        </a:rPr>
+                        <a:t>as Obj 2 </a:t>
+                      </a:r>
+                    </a:p>
+                  </a:txBody>
+                  <a:tcPr/>
+                </a:tc>
+                <a:tc>
+                  <a:txBody>
+                    <a:bodyPr/>
+                    <a:lstStyle/>
+                    <a:p>
+                      <a:pPr marL="0" marR="0" lvl="0" indent="0" algn="ctr" defTabSz="914400" rtl="0" eaLnBrk="1" fontAlgn="auto" latinLnBrk="0" hangingPunct="1">
+                        <a:lnSpc>
+                          <a:spcPct val="100000"/>
+                        </a:lnSpc>
+                        <a:spcBef>
+                          <a:spcPts val="0"/>
+                        </a:spcBef>
+                        <a:spcAft>
+                          <a:spcPts val="0"/>
+                        </a:spcAft>
+                        <a:buClrTx/>
+                        <a:buSzTx/>
+                        <a:buFontTx/>
+                        <a:buNone/>
+                        <a:tabLst/>
+                        <a:defRPr/>
+                      </a:pPr>
+                      <a:r>
+                        <a:rPr lang="en-US" b="0" dirty="0">
+                          <a:latin typeface="Times New Roman" panose="02020603050405020304" pitchFamily="18" charset="0"/>
+                          <a:cs typeface="Times New Roman" panose="02020603050405020304" pitchFamily="18" charset="0"/>
+                        </a:rPr>
+                        <a:t>Classified </a:t>
+                      </a:r>
+                    </a:p>
+                    <a:p>
+                      <a:pPr marL="0" marR="0" lvl="0" indent="0" algn="ctr" defTabSz="914400" rtl="0" eaLnBrk="1" fontAlgn="auto" latinLnBrk="0" hangingPunct="1">
+                        <a:lnSpc>
+                          <a:spcPct val="100000"/>
+                        </a:lnSpc>
+                        <a:spcBef>
+                          <a:spcPts val="0"/>
+                        </a:spcBef>
+                        <a:spcAft>
+                          <a:spcPts val="0"/>
+                        </a:spcAft>
+                        <a:buClrTx/>
+                        <a:buSzTx/>
+                        <a:buFontTx/>
+                        <a:buNone/>
+                        <a:tabLst/>
+                        <a:defRPr/>
+                      </a:pPr>
+                      <a:r>
+                        <a:rPr lang="en-US" b="0" dirty="0">
+                          <a:latin typeface="Times New Roman" panose="02020603050405020304" pitchFamily="18" charset="0"/>
+                          <a:cs typeface="Times New Roman" panose="02020603050405020304" pitchFamily="18" charset="0"/>
+                        </a:rPr>
+                        <a:t>as Obj 3  </a:t>
+                      </a:r>
+                    </a:p>
+                  </a:txBody>
+                  <a:tcPr/>
+                </a:tc>
+                <a:extLst>
+                  <a:ext uri="{0D108BD9-81ED-4DB2-BD59-A6C34878D82A}">
+                    <a16:rowId xmlns:a16="http://schemas.microsoft.com/office/drawing/2014/main" val="4106385171"/>
+                  </a:ext>
+                </a:extLst>
+              </a:tr>
+              <a:tr h="369039">
+                <a:tc>
+                  <a:txBody>
+                    <a:bodyPr/>
+                    <a:lstStyle/>
+                    <a:p>
+                      <a:pPr algn="l"/>
+                      <a:r>
+                        <a:rPr lang="en-US" b="0" dirty="0">
+                          <a:latin typeface="Times New Roman" panose="02020603050405020304" pitchFamily="18" charset="0"/>
+                          <a:cs typeface="Times New Roman" panose="02020603050405020304" pitchFamily="18" charset="0"/>
+                        </a:rPr>
+                        <a:t>T1</a:t>
+                      </a:r>
+                    </a:p>
+                  </a:txBody>
+                  <a:tcPr/>
+                </a:tc>
+                <a:tc>
+                  <a:txBody>
+                    <a:bodyPr/>
+                    <a:lstStyle/>
+                    <a:p>
+                      <a:pPr algn="ctr"/>
+                      <a:r>
+                        <a:rPr lang="en-US" b="0">
+                          <a:latin typeface="Times New Roman" panose="02020603050405020304" pitchFamily="18" charset="0"/>
+                          <a:cs typeface="Times New Roman" panose="02020603050405020304" pitchFamily="18" charset="0"/>
+                        </a:rPr>
+                        <a:t>100</a:t>
+                      </a:r>
+                      <a:endParaRPr lang="en-US" b="0" dirty="0">
+                        <a:latin typeface="Times New Roman" panose="02020603050405020304" pitchFamily="18" charset="0"/>
+                        <a:cs typeface="Times New Roman" panose="02020603050405020304" pitchFamily="18" charset="0"/>
+                      </a:endParaRPr>
+                    </a:p>
+                  </a:txBody>
+                  <a:tcPr/>
+                </a:tc>
+                <a:tc>
+                  <a:txBody>
+                    <a:bodyPr/>
+                    <a:lstStyle/>
+                    <a:p>
+                      <a:pPr algn="ctr"/>
+                      <a:r>
+                        <a:rPr lang="en-US" b="0" dirty="0">
+                          <a:latin typeface="Times New Roman" panose="02020603050405020304" pitchFamily="18" charset="0"/>
+                          <a:cs typeface="Times New Roman" panose="02020603050405020304" pitchFamily="18" charset="0"/>
+                        </a:rPr>
+                        <a:t>0</a:t>
+                      </a:r>
+                    </a:p>
+                  </a:txBody>
+                  <a:tcPr/>
+                </a:tc>
+                <a:tc>
+                  <a:txBody>
+                    <a:bodyPr/>
+                    <a:lstStyle/>
+                    <a:p>
+                      <a:pPr algn="ctr"/>
+                      <a:r>
+                        <a:rPr lang="en-US" b="0" dirty="0">
+                          <a:latin typeface="Times New Roman" panose="02020603050405020304" pitchFamily="18" charset="0"/>
+                          <a:cs typeface="Times New Roman" panose="02020603050405020304" pitchFamily="18" charset="0"/>
+                        </a:rPr>
+                        <a:t>0</a:t>
+                      </a:r>
+                    </a:p>
+                  </a:txBody>
+                  <a:tcPr/>
+                </a:tc>
+                <a:extLst>
+                  <a:ext uri="{0D108BD9-81ED-4DB2-BD59-A6C34878D82A}">
+                    <a16:rowId xmlns:a16="http://schemas.microsoft.com/office/drawing/2014/main" val="1136935708"/>
+                  </a:ext>
+                </a:extLst>
+              </a:tr>
+              <a:tr h="369039">
+                <a:tc>
+                  <a:txBody>
+                    <a:bodyPr/>
+                    <a:lstStyle/>
+                    <a:p>
+                      <a:pPr algn="l"/>
+                      <a:r>
+                        <a:rPr lang="en-US" b="0">
+                          <a:latin typeface="Times New Roman" panose="02020603050405020304" pitchFamily="18" charset="0"/>
+                          <a:cs typeface="Times New Roman" panose="02020603050405020304" pitchFamily="18" charset="0"/>
+                        </a:rPr>
+                        <a:t>T2</a:t>
+                      </a:r>
+                      <a:endParaRPr lang="en-US" b="0" dirty="0">
+                        <a:latin typeface="Times New Roman" panose="02020603050405020304" pitchFamily="18" charset="0"/>
+                        <a:cs typeface="Times New Roman" panose="02020603050405020304" pitchFamily="18" charset="0"/>
+                      </a:endParaRPr>
+                    </a:p>
+                  </a:txBody>
+                  <a:tcPr/>
+                </a:tc>
+                <a:tc>
+                  <a:txBody>
+                    <a:bodyPr/>
+                    <a:lstStyle/>
+                    <a:p>
+                      <a:pPr algn="ctr"/>
+                      <a:r>
+                        <a:rPr lang="en-US" b="0">
+                          <a:latin typeface="Times New Roman" panose="02020603050405020304" pitchFamily="18" charset="0"/>
+                          <a:cs typeface="Times New Roman" panose="02020603050405020304" pitchFamily="18" charset="0"/>
+                        </a:rPr>
+                        <a:t>100</a:t>
+                      </a:r>
+                      <a:endParaRPr lang="en-US" b="0" dirty="0">
+                        <a:latin typeface="Times New Roman" panose="02020603050405020304" pitchFamily="18" charset="0"/>
+                        <a:cs typeface="Times New Roman" panose="02020603050405020304" pitchFamily="18" charset="0"/>
+                      </a:endParaRPr>
+                    </a:p>
+                  </a:txBody>
+                  <a:tcPr/>
+                </a:tc>
+                <a:tc>
+                  <a:txBody>
+                    <a:bodyPr/>
+                    <a:lstStyle/>
+                    <a:p>
+                      <a:pPr algn="ctr"/>
+                      <a:r>
+                        <a:rPr lang="en-US" b="0" dirty="0">
+                          <a:latin typeface="Times New Roman" panose="02020603050405020304" pitchFamily="18" charset="0"/>
+                          <a:cs typeface="Times New Roman" panose="02020603050405020304" pitchFamily="18" charset="0"/>
+                        </a:rPr>
+                        <a:t>0</a:t>
+                      </a:r>
+                    </a:p>
+                  </a:txBody>
+                  <a:tcPr/>
+                </a:tc>
+                <a:tc>
+                  <a:txBody>
+                    <a:bodyPr/>
+                    <a:lstStyle/>
+                    <a:p>
+                      <a:pPr algn="ctr"/>
+                      <a:r>
+                        <a:rPr lang="en-US" b="0" dirty="0">
+                          <a:latin typeface="Times New Roman" panose="02020603050405020304" pitchFamily="18" charset="0"/>
+                          <a:cs typeface="Times New Roman" panose="02020603050405020304" pitchFamily="18" charset="0"/>
+                        </a:rPr>
+                        <a:t>0</a:t>
+                      </a:r>
+                    </a:p>
+                  </a:txBody>
+                  <a:tcPr/>
+                </a:tc>
+                <a:extLst>
+                  <a:ext uri="{0D108BD9-81ED-4DB2-BD59-A6C34878D82A}">
+                    <a16:rowId xmlns:a16="http://schemas.microsoft.com/office/drawing/2014/main" val="313513368"/>
+                  </a:ext>
+                </a:extLst>
+              </a:tr>
+              <a:tr h="369039">
+                <a:tc>
+                  <a:txBody>
+                    <a:bodyPr/>
+                    <a:lstStyle/>
+                    <a:p>
+                      <a:pPr algn="l"/>
+                      <a:r>
+                        <a:rPr lang="en-US" b="0">
+                          <a:latin typeface="Times New Roman" panose="02020603050405020304" pitchFamily="18" charset="0"/>
+                          <a:cs typeface="Times New Roman" panose="02020603050405020304" pitchFamily="18" charset="0"/>
+                        </a:rPr>
+                        <a:t>T3</a:t>
+                      </a:r>
+                      <a:endParaRPr lang="en-US" b="0" dirty="0">
+                        <a:latin typeface="Times New Roman" panose="02020603050405020304" pitchFamily="18" charset="0"/>
+                        <a:cs typeface="Times New Roman" panose="02020603050405020304" pitchFamily="18" charset="0"/>
+                      </a:endParaRPr>
+                    </a:p>
+                  </a:txBody>
+                  <a:tcPr/>
+                </a:tc>
+                <a:tc>
+                  <a:txBody>
+                    <a:bodyPr/>
+                    <a:lstStyle/>
+                    <a:p>
+                      <a:pPr algn="ctr"/>
+                      <a:r>
+                        <a:rPr lang="en-US" b="0" dirty="0">
+                          <a:latin typeface="Times New Roman" panose="02020603050405020304" pitchFamily="18" charset="0"/>
+                          <a:cs typeface="Times New Roman" panose="02020603050405020304" pitchFamily="18" charset="0"/>
+                        </a:rPr>
+                        <a:t>84</a:t>
+                      </a:r>
+                    </a:p>
+                  </a:txBody>
+                  <a:tcPr/>
+                </a:tc>
+                <a:tc>
+                  <a:txBody>
+                    <a:bodyPr/>
+                    <a:lstStyle/>
+                    <a:p>
+                      <a:pPr algn="ctr"/>
+                      <a:r>
+                        <a:rPr lang="en-US" b="0" dirty="0">
+                          <a:latin typeface="Times New Roman" panose="02020603050405020304" pitchFamily="18" charset="0"/>
+                          <a:cs typeface="Times New Roman" panose="02020603050405020304" pitchFamily="18" charset="0"/>
+                        </a:rPr>
+                        <a:t>16</a:t>
+                      </a:r>
+                    </a:p>
+                  </a:txBody>
+                  <a:tcPr/>
+                </a:tc>
+                <a:tc>
+                  <a:txBody>
+                    <a:bodyPr/>
+                    <a:lstStyle/>
+                    <a:p>
+                      <a:pPr algn="ctr"/>
+                      <a:r>
+                        <a:rPr lang="en-US" b="0" dirty="0">
+                          <a:latin typeface="Times New Roman" panose="02020603050405020304" pitchFamily="18" charset="0"/>
+                          <a:cs typeface="Times New Roman" panose="02020603050405020304" pitchFamily="18" charset="0"/>
+                        </a:rPr>
+                        <a:t>0</a:t>
+                      </a:r>
+                    </a:p>
+                  </a:txBody>
+                  <a:tcPr/>
+                </a:tc>
+                <a:extLst>
+                  <a:ext uri="{0D108BD9-81ED-4DB2-BD59-A6C34878D82A}">
+                    <a16:rowId xmlns:a16="http://schemas.microsoft.com/office/drawing/2014/main" val="4236926611"/>
+                  </a:ext>
+                </a:extLst>
+              </a:tr>
+              <a:tr h="369039">
+                <a:tc>
+                  <a:txBody>
+                    <a:bodyPr/>
+                    <a:lstStyle/>
+                    <a:p>
+                      <a:pPr algn="l"/>
+                      <a:r>
+                        <a:rPr lang="en-US" b="0">
+                          <a:latin typeface="Times New Roman" panose="02020603050405020304" pitchFamily="18" charset="0"/>
+                          <a:cs typeface="Times New Roman" panose="02020603050405020304" pitchFamily="18" charset="0"/>
+                        </a:rPr>
+                        <a:t>T4</a:t>
+                      </a:r>
+                      <a:endParaRPr lang="en-US" b="0" dirty="0">
+                        <a:latin typeface="Times New Roman" panose="02020603050405020304" pitchFamily="18" charset="0"/>
+                        <a:cs typeface="Times New Roman" panose="02020603050405020304" pitchFamily="18" charset="0"/>
+                      </a:endParaRPr>
+                    </a:p>
+                  </a:txBody>
+                  <a:tcPr/>
+                </a:tc>
+                <a:tc>
+                  <a:txBody>
+                    <a:bodyPr/>
+                    <a:lstStyle/>
+                    <a:p>
+                      <a:pPr algn="ctr"/>
+                      <a:r>
+                        <a:rPr lang="en-US" b="0" dirty="0">
+                          <a:latin typeface="Times New Roman" panose="02020603050405020304" pitchFamily="18" charset="0"/>
+                          <a:cs typeface="Times New Roman" panose="02020603050405020304" pitchFamily="18" charset="0"/>
+                        </a:rPr>
+                        <a:t>88</a:t>
+                      </a:r>
+                    </a:p>
+                  </a:txBody>
+                  <a:tcPr/>
+                </a:tc>
+                <a:tc>
+                  <a:txBody>
+                    <a:bodyPr/>
+                    <a:lstStyle/>
+                    <a:p>
+                      <a:pPr algn="ctr"/>
+                      <a:r>
+                        <a:rPr lang="en-US" b="0" dirty="0">
+                          <a:latin typeface="Times New Roman" panose="02020603050405020304" pitchFamily="18" charset="0"/>
+                          <a:cs typeface="Times New Roman" panose="02020603050405020304" pitchFamily="18" charset="0"/>
+                        </a:rPr>
+                        <a:t>12</a:t>
+                      </a:r>
+                    </a:p>
+                  </a:txBody>
+                  <a:tcPr/>
+                </a:tc>
+                <a:tc>
+                  <a:txBody>
+                    <a:bodyPr/>
+                    <a:lstStyle/>
+                    <a:p>
+                      <a:pPr algn="ctr"/>
+                      <a:r>
+                        <a:rPr lang="en-US" b="0" dirty="0">
+                          <a:latin typeface="Times New Roman" panose="02020603050405020304" pitchFamily="18" charset="0"/>
+                          <a:cs typeface="Times New Roman" panose="02020603050405020304" pitchFamily="18" charset="0"/>
+                        </a:rPr>
+                        <a:t>0</a:t>
+                      </a:r>
+                    </a:p>
+                  </a:txBody>
+                  <a:tcPr/>
+                </a:tc>
+                <a:extLst>
+                  <a:ext uri="{0D108BD9-81ED-4DB2-BD59-A6C34878D82A}">
+                    <a16:rowId xmlns:a16="http://schemas.microsoft.com/office/drawing/2014/main" val="3274794052"/>
+                  </a:ext>
+                </a:extLst>
+              </a:tr>
+              <a:tr h="369039">
+                <a:tc>
+                  <a:txBody>
+                    <a:bodyPr/>
+                    <a:lstStyle/>
+                    <a:p>
+                      <a:pPr algn="l"/>
+                      <a:r>
+                        <a:rPr lang="en-US" b="0">
+                          <a:latin typeface="Times New Roman" panose="02020603050405020304" pitchFamily="18" charset="0"/>
+                          <a:cs typeface="Times New Roman" panose="02020603050405020304" pitchFamily="18" charset="0"/>
+                        </a:rPr>
+                        <a:t>T5</a:t>
+                      </a:r>
+                      <a:endParaRPr lang="en-US" b="0" dirty="0">
+                        <a:latin typeface="Times New Roman" panose="02020603050405020304" pitchFamily="18" charset="0"/>
+                        <a:cs typeface="Times New Roman" panose="02020603050405020304" pitchFamily="18" charset="0"/>
+                      </a:endParaRPr>
+                    </a:p>
+                  </a:txBody>
+                  <a:tcPr/>
+                </a:tc>
+                <a:tc>
+                  <a:txBody>
+                    <a:bodyPr/>
+                    <a:lstStyle/>
+                    <a:p>
+                      <a:pPr algn="ctr"/>
+                      <a:r>
+                        <a:rPr lang="en-US" b="0" dirty="0">
+                          <a:latin typeface="Times New Roman" panose="02020603050405020304" pitchFamily="18" charset="0"/>
+                          <a:cs typeface="Times New Roman" panose="02020603050405020304" pitchFamily="18" charset="0"/>
+                        </a:rPr>
+                        <a:t>88</a:t>
+                      </a:r>
+                    </a:p>
+                  </a:txBody>
+                  <a:tcPr/>
+                </a:tc>
+                <a:tc>
+                  <a:txBody>
+                    <a:bodyPr/>
+                    <a:lstStyle/>
+                    <a:p>
+                      <a:pPr algn="ctr"/>
+                      <a:r>
+                        <a:rPr lang="en-US" b="0" dirty="0">
+                          <a:latin typeface="Times New Roman" panose="02020603050405020304" pitchFamily="18" charset="0"/>
+                          <a:cs typeface="Times New Roman" panose="02020603050405020304" pitchFamily="18" charset="0"/>
+                        </a:rPr>
+                        <a:t>12</a:t>
+                      </a:r>
+                    </a:p>
+                  </a:txBody>
+                  <a:tcPr/>
+                </a:tc>
+                <a:tc>
+                  <a:txBody>
+                    <a:bodyPr/>
+                    <a:lstStyle/>
+                    <a:p>
+                      <a:pPr algn="ctr"/>
+                      <a:r>
+                        <a:rPr lang="en-US" b="0" dirty="0">
+                          <a:latin typeface="Times New Roman" panose="02020603050405020304" pitchFamily="18" charset="0"/>
+                          <a:cs typeface="Times New Roman" panose="02020603050405020304" pitchFamily="18" charset="0"/>
+                        </a:rPr>
+                        <a:t>0</a:t>
+                      </a:r>
+                    </a:p>
+                  </a:txBody>
+                  <a:tcPr/>
+                </a:tc>
+                <a:extLst>
+                  <a:ext uri="{0D108BD9-81ED-4DB2-BD59-A6C34878D82A}">
+                    <a16:rowId xmlns:a16="http://schemas.microsoft.com/office/drawing/2014/main" val="3730789768"/>
+                  </a:ext>
+                </a:extLst>
+              </a:tr>
+              <a:tr h="369039">
+                <a:tc>
+                  <a:txBody>
+                    <a:bodyPr/>
+                    <a:lstStyle/>
+                    <a:p>
+                      <a:pPr algn="l"/>
+                      <a:r>
+                        <a:rPr lang="en-US" b="0">
+                          <a:latin typeface="Times New Roman" panose="02020603050405020304" pitchFamily="18" charset="0"/>
+                          <a:cs typeface="Times New Roman" panose="02020603050405020304" pitchFamily="18" charset="0"/>
+                        </a:rPr>
+                        <a:t>T6</a:t>
+                      </a:r>
+                      <a:endParaRPr lang="en-US" b="0" dirty="0">
+                        <a:latin typeface="Times New Roman" panose="02020603050405020304" pitchFamily="18" charset="0"/>
+                        <a:cs typeface="Times New Roman" panose="02020603050405020304" pitchFamily="18" charset="0"/>
+                      </a:endParaRPr>
+                    </a:p>
+                  </a:txBody>
+                  <a:tcPr/>
+                </a:tc>
+                <a:tc>
+                  <a:txBody>
+                    <a:bodyPr/>
+                    <a:lstStyle/>
+                    <a:p>
+                      <a:pPr algn="ctr"/>
+                      <a:r>
+                        <a:rPr lang="en-US" b="0" dirty="0">
+                          <a:latin typeface="Times New Roman" panose="02020603050405020304" pitchFamily="18" charset="0"/>
+                          <a:cs typeface="Times New Roman" panose="02020603050405020304" pitchFamily="18" charset="0"/>
+                        </a:rPr>
+                        <a:t>12</a:t>
+                      </a:r>
+                    </a:p>
+                  </a:txBody>
+                  <a:tcPr/>
+                </a:tc>
+                <a:tc>
+                  <a:txBody>
+                    <a:bodyPr/>
+                    <a:lstStyle/>
+                    <a:p>
+                      <a:pPr algn="ctr"/>
+                      <a:r>
+                        <a:rPr lang="en-US" b="0" dirty="0">
+                          <a:latin typeface="Times New Roman" panose="02020603050405020304" pitchFamily="18" charset="0"/>
+                          <a:cs typeface="Times New Roman" panose="02020603050405020304" pitchFamily="18" charset="0"/>
+                        </a:rPr>
+                        <a:t>0</a:t>
+                      </a:r>
+                    </a:p>
+                  </a:txBody>
+                  <a:tcPr/>
+                </a:tc>
+                <a:tc>
+                  <a:txBody>
+                    <a:bodyPr/>
+                    <a:lstStyle/>
+                    <a:p>
+                      <a:pPr algn="ctr"/>
+                      <a:r>
+                        <a:rPr lang="en-US" b="0" dirty="0">
+                          <a:latin typeface="Times New Roman" panose="02020603050405020304" pitchFamily="18" charset="0"/>
+                          <a:cs typeface="Times New Roman" panose="02020603050405020304" pitchFamily="18" charset="0"/>
+                        </a:rPr>
+                        <a:t>88</a:t>
+                      </a:r>
+                    </a:p>
+                  </a:txBody>
+                  <a:tcPr/>
+                </a:tc>
+                <a:extLst>
+                  <a:ext uri="{0D108BD9-81ED-4DB2-BD59-A6C34878D82A}">
+                    <a16:rowId xmlns:a16="http://schemas.microsoft.com/office/drawing/2014/main" val="1251216352"/>
+                  </a:ext>
+                </a:extLst>
+              </a:tr>
+              <a:tr h="369039">
+                <a:tc>
+                  <a:txBody>
+                    <a:bodyPr/>
+                    <a:lstStyle/>
+                    <a:p>
+                      <a:pPr algn="l"/>
+                      <a:r>
+                        <a:rPr lang="en-US" b="0">
+                          <a:latin typeface="Times New Roman" panose="02020603050405020304" pitchFamily="18" charset="0"/>
+                          <a:cs typeface="Times New Roman" panose="02020603050405020304" pitchFamily="18" charset="0"/>
+                        </a:rPr>
+                        <a:t>T7</a:t>
+                      </a:r>
+                      <a:endParaRPr lang="en-US" b="0" dirty="0">
+                        <a:latin typeface="Times New Roman" panose="02020603050405020304" pitchFamily="18" charset="0"/>
+                        <a:cs typeface="Times New Roman" panose="02020603050405020304" pitchFamily="18" charset="0"/>
+                      </a:endParaRPr>
+                    </a:p>
+                  </a:txBody>
+                  <a:tcPr/>
+                </a:tc>
+                <a:tc>
+                  <a:txBody>
+                    <a:bodyPr/>
+                    <a:lstStyle/>
+                    <a:p>
+                      <a:pPr algn="ctr"/>
+                      <a:r>
+                        <a:rPr lang="en-US" b="0" dirty="0">
+                          <a:latin typeface="Times New Roman" panose="02020603050405020304" pitchFamily="18" charset="0"/>
+                          <a:cs typeface="Times New Roman" panose="02020603050405020304" pitchFamily="18" charset="0"/>
+                        </a:rPr>
+                        <a:t>70</a:t>
+                      </a:r>
+                    </a:p>
+                  </a:txBody>
+                  <a:tcPr/>
+                </a:tc>
+                <a:tc>
+                  <a:txBody>
+                    <a:bodyPr/>
+                    <a:lstStyle/>
+                    <a:p>
+                      <a:pPr algn="ctr"/>
+                      <a:r>
+                        <a:rPr lang="en-US" b="0" dirty="0">
+                          <a:latin typeface="Times New Roman" panose="02020603050405020304" pitchFamily="18" charset="0"/>
+                          <a:cs typeface="Times New Roman" panose="02020603050405020304" pitchFamily="18" charset="0"/>
+                        </a:rPr>
+                        <a:t>0</a:t>
+                      </a:r>
+                    </a:p>
+                  </a:txBody>
+                  <a:tcPr/>
+                </a:tc>
+                <a:tc>
+                  <a:txBody>
+                    <a:bodyPr/>
+                    <a:lstStyle/>
+                    <a:p>
+                      <a:pPr algn="ctr"/>
+                      <a:r>
+                        <a:rPr lang="en-US" b="0" dirty="0">
+                          <a:latin typeface="Times New Roman" panose="02020603050405020304" pitchFamily="18" charset="0"/>
+                          <a:cs typeface="Times New Roman" panose="02020603050405020304" pitchFamily="18" charset="0"/>
+                        </a:rPr>
+                        <a:t>30</a:t>
+                      </a:r>
+                    </a:p>
+                  </a:txBody>
+                  <a:tcPr/>
+                </a:tc>
+                <a:extLst>
+                  <a:ext uri="{0D108BD9-81ED-4DB2-BD59-A6C34878D82A}">
+                    <a16:rowId xmlns:a16="http://schemas.microsoft.com/office/drawing/2014/main" val="4095127486"/>
+                  </a:ext>
+                </a:extLst>
+              </a:tr>
+              <a:tr h="369039">
+                <a:tc>
+                  <a:txBody>
+                    <a:bodyPr/>
+                    <a:lstStyle/>
+                    <a:p>
+                      <a:pPr algn="l"/>
+                      <a:r>
+                        <a:rPr lang="en-US" b="0">
+                          <a:latin typeface="Times New Roman" panose="02020603050405020304" pitchFamily="18" charset="0"/>
+                          <a:cs typeface="Times New Roman" panose="02020603050405020304" pitchFamily="18" charset="0"/>
+                        </a:rPr>
+                        <a:t>T8</a:t>
+                      </a:r>
+                      <a:endParaRPr lang="en-US" b="0" dirty="0">
+                        <a:latin typeface="Times New Roman" panose="02020603050405020304" pitchFamily="18" charset="0"/>
+                        <a:cs typeface="Times New Roman" panose="02020603050405020304" pitchFamily="18" charset="0"/>
+                      </a:endParaRPr>
+                    </a:p>
+                  </a:txBody>
+                  <a:tcPr/>
+                </a:tc>
+                <a:tc>
+                  <a:txBody>
+                    <a:bodyPr/>
+                    <a:lstStyle/>
+                    <a:p>
+                      <a:pPr algn="ctr"/>
+                      <a:r>
+                        <a:rPr lang="en-US" b="0" dirty="0">
+                          <a:latin typeface="Times New Roman" panose="02020603050405020304" pitchFamily="18" charset="0"/>
+                          <a:cs typeface="Times New Roman" panose="02020603050405020304" pitchFamily="18" charset="0"/>
+                        </a:rPr>
+                        <a:t>60</a:t>
+                      </a:r>
+                    </a:p>
+                  </a:txBody>
+                  <a:tcPr/>
+                </a:tc>
+                <a:tc>
+                  <a:txBody>
+                    <a:bodyPr/>
+                    <a:lstStyle/>
+                    <a:p>
+                      <a:pPr algn="ctr"/>
+                      <a:r>
+                        <a:rPr lang="en-US" b="0" dirty="0">
+                          <a:latin typeface="Times New Roman" panose="02020603050405020304" pitchFamily="18" charset="0"/>
+                          <a:cs typeface="Times New Roman" panose="02020603050405020304" pitchFamily="18" charset="0"/>
+                        </a:rPr>
+                        <a:t>0</a:t>
+                      </a:r>
+                    </a:p>
+                  </a:txBody>
+                  <a:tcPr/>
+                </a:tc>
+                <a:tc>
+                  <a:txBody>
+                    <a:bodyPr/>
+                    <a:lstStyle/>
+                    <a:p>
+                      <a:pPr algn="ctr"/>
+                      <a:r>
+                        <a:rPr lang="en-US" b="0" dirty="0">
+                          <a:latin typeface="Times New Roman" panose="02020603050405020304" pitchFamily="18" charset="0"/>
+                          <a:cs typeface="Times New Roman" panose="02020603050405020304" pitchFamily="18" charset="0"/>
+                        </a:rPr>
+                        <a:t>40</a:t>
+                      </a:r>
+                    </a:p>
+                  </a:txBody>
+                  <a:tcPr/>
+                </a:tc>
+                <a:extLst>
+                  <a:ext uri="{0D108BD9-81ED-4DB2-BD59-A6C34878D82A}">
+                    <a16:rowId xmlns:a16="http://schemas.microsoft.com/office/drawing/2014/main" val="2178027628"/>
+                  </a:ext>
+                </a:extLst>
+              </a:tr>
+              <a:tr h="369039">
+                <a:tc>
+                  <a:txBody>
+                    <a:bodyPr/>
+                    <a:lstStyle/>
+                    <a:p>
+                      <a:pPr algn="l"/>
+                      <a:r>
+                        <a:rPr lang="en-US" b="0">
+                          <a:latin typeface="Times New Roman" panose="02020603050405020304" pitchFamily="18" charset="0"/>
+                          <a:cs typeface="Times New Roman" panose="02020603050405020304" pitchFamily="18" charset="0"/>
+                        </a:rPr>
+                        <a:t>T9</a:t>
+                      </a:r>
+                      <a:endParaRPr lang="en-US" b="0" dirty="0">
+                        <a:latin typeface="Times New Roman" panose="02020603050405020304" pitchFamily="18" charset="0"/>
+                        <a:cs typeface="Times New Roman" panose="02020603050405020304" pitchFamily="18" charset="0"/>
+                      </a:endParaRPr>
+                    </a:p>
+                  </a:txBody>
+                  <a:tcPr/>
+                </a:tc>
+                <a:tc>
+                  <a:txBody>
+                    <a:bodyPr/>
+                    <a:lstStyle/>
+                    <a:p>
+                      <a:pPr algn="ctr"/>
+                      <a:r>
+                        <a:rPr lang="en-US" b="0" dirty="0">
+                          <a:latin typeface="Times New Roman" panose="02020603050405020304" pitchFamily="18" charset="0"/>
+                          <a:cs typeface="Times New Roman" panose="02020603050405020304" pitchFamily="18" charset="0"/>
+                        </a:rPr>
+                        <a:t>64</a:t>
+                      </a:r>
+                    </a:p>
+                  </a:txBody>
+                  <a:tcPr/>
+                </a:tc>
+                <a:tc>
+                  <a:txBody>
+                    <a:bodyPr/>
+                    <a:lstStyle/>
+                    <a:p>
+                      <a:pPr algn="ctr"/>
+                      <a:r>
+                        <a:rPr lang="en-US" b="0" dirty="0">
+                          <a:latin typeface="Times New Roman" panose="02020603050405020304" pitchFamily="18" charset="0"/>
+                          <a:cs typeface="Times New Roman" panose="02020603050405020304" pitchFamily="18" charset="0"/>
+                        </a:rPr>
+                        <a:t>0</a:t>
+                      </a:r>
+                    </a:p>
+                  </a:txBody>
+                  <a:tcPr/>
+                </a:tc>
+                <a:tc>
+                  <a:txBody>
+                    <a:bodyPr/>
+                    <a:lstStyle/>
+                    <a:p>
+                      <a:pPr algn="ctr"/>
+                      <a:r>
+                        <a:rPr lang="en-US" b="0" dirty="0">
+                          <a:latin typeface="Times New Roman" panose="02020603050405020304" pitchFamily="18" charset="0"/>
+                          <a:cs typeface="Times New Roman" panose="02020603050405020304" pitchFamily="18" charset="0"/>
+                        </a:rPr>
+                        <a:t>36</a:t>
+                      </a:r>
+                    </a:p>
+                  </a:txBody>
+                  <a:tcPr/>
+                </a:tc>
+                <a:extLst>
+                  <a:ext uri="{0D108BD9-81ED-4DB2-BD59-A6C34878D82A}">
+                    <a16:rowId xmlns:a16="http://schemas.microsoft.com/office/drawing/2014/main" val="3667269582"/>
+                  </a:ext>
+                </a:extLst>
+              </a:tr>
+              <a:tr h="369039">
+                <a:tc>
+                  <a:txBody>
+                    <a:bodyPr/>
+                    <a:lstStyle/>
+                    <a:p>
+                      <a:pPr algn="l"/>
+                      <a:r>
+                        <a:rPr lang="en-US" b="0">
+                          <a:latin typeface="Times New Roman" panose="02020603050405020304" pitchFamily="18" charset="0"/>
+                          <a:cs typeface="Times New Roman" panose="02020603050405020304" pitchFamily="18" charset="0"/>
+                        </a:rPr>
+                        <a:t>T10</a:t>
+                      </a:r>
+                      <a:endParaRPr lang="en-US" b="0" dirty="0">
+                        <a:latin typeface="Times New Roman" panose="02020603050405020304" pitchFamily="18" charset="0"/>
+                        <a:cs typeface="Times New Roman" panose="02020603050405020304" pitchFamily="18" charset="0"/>
+                      </a:endParaRPr>
+                    </a:p>
+                  </a:txBody>
+                  <a:tcPr/>
+                </a:tc>
+                <a:tc>
+                  <a:txBody>
+                    <a:bodyPr/>
+                    <a:lstStyle/>
+                    <a:p>
+                      <a:pPr algn="ctr"/>
+                      <a:r>
+                        <a:rPr lang="en-US" b="0" dirty="0">
+                          <a:latin typeface="Times New Roman" panose="02020603050405020304" pitchFamily="18" charset="0"/>
+                          <a:cs typeface="Times New Roman" panose="02020603050405020304" pitchFamily="18" charset="0"/>
+                        </a:rPr>
+                        <a:t>80</a:t>
+                      </a:r>
+                    </a:p>
+                  </a:txBody>
+                  <a:tcPr/>
+                </a:tc>
+                <a:tc>
+                  <a:txBody>
+                    <a:bodyPr/>
+                    <a:lstStyle/>
+                    <a:p>
+                      <a:pPr algn="ctr"/>
+                      <a:r>
+                        <a:rPr lang="en-US" b="0" dirty="0">
+                          <a:latin typeface="Times New Roman" panose="02020603050405020304" pitchFamily="18" charset="0"/>
+                          <a:cs typeface="Times New Roman" panose="02020603050405020304" pitchFamily="18" charset="0"/>
+                        </a:rPr>
+                        <a:t>0</a:t>
+                      </a:r>
+                    </a:p>
+                  </a:txBody>
+                  <a:tcPr/>
+                </a:tc>
+                <a:tc>
+                  <a:txBody>
+                    <a:bodyPr/>
+                    <a:lstStyle/>
+                    <a:p>
+                      <a:pPr algn="ctr"/>
+                      <a:r>
+                        <a:rPr lang="en-US" b="0" dirty="0">
+                          <a:latin typeface="Times New Roman" panose="02020603050405020304" pitchFamily="18" charset="0"/>
+                          <a:cs typeface="Times New Roman" panose="02020603050405020304" pitchFamily="18" charset="0"/>
+                        </a:rPr>
+                        <a:t>20</a:t>
+                      </a:r>
+                    </a:p>
+                  </a:txBody>
+                  <a:tcPr/>
+                </a:tc>
+                <a:extLst>
+                  <a:ext uri="{0D108BD9-81ED-4DB2-BD59-A6C34878D82A}">
+                    <a16:rowId xmlns:a16="http://schemas.microsoft.com/office/drawing/2014/main" val="2137233072"/>
+                  </a:ext>
+                </a:extLst>
+              </a:tr>
+              <a:tr h="369039">
+                <a:tc>
+                  <a:txBody>
+                    <a:bodyPr/>
+                    <a:lstStyle/>
+                    <a:p>
+                      <a:pPr algn="l"/>
+                      <a:r>
+                        <a:rPr lang="en-US" b="0">
+                          <a:latin typeface="Times New Roman" panose="02020603050405020304" pitchFamily="18" charset="0"/>
+                          <a:cs typeface="Times New Roman" panose="02020603050405020304" pitchFamily="18" charset="0"/>
+                        </a:rPr>
+                        <a:t>T11</a:t>
+                      </a:r>
+                      <a:endParaRPr lang="en-US" b="0" dirty="0">
+                        <a:latin typeface="Times New Roman" panose="02020603050405020304" pitchFamily="18" charset="0"/>
+                        <a:cs typeface="Times New Roman" panose="02020603050405020304" pitchFamily="18" charset="0"/>
+                      </a:endParaRPr>
+                    </a:p>
+                  </a:txBody>
+                  <a:tcPr/>
+                </a:tc>
+                <a:tc>
+                  <a:txBody>
+                    <a:bodyPr/>
+                    <a:lstStyle/>
+                    <a:p>
+                      <a:pPr algn="ctr"/>
+                      <a:r>
+                        <a:rPr lang="en-US" b="0" dirty="0">
+                          <a:latin typeface="Times New Roman" panose="02020603050405020304" pitchFamily="18" charset="0"/>
+                          <a:cs typeface="Times New Roman" panose="02020603050405020304" pitchFamily="18" charset="0"/>
+                        </a:rPr>
+                        <a:t>82</a:t>
+                      </a:r>
+                    </a:p>
+                  </a:txBody>
+                  <a:tcPr/>
+                </a:tc>
+                <a:tc>
+                  <a:txBody>
+                    <a:bodyPr/>
+                    <a:lstStyle/>
+                    <a:p>
+                      <a:pPr algn="ctr"/>
+                      <a:r>
+                        <a:rPr lang="en-US" b="0" dirty="0">
+                          <a:latin typeface="Times New Roman" panose="02020603050405020304" pitchFamily="18" charset="0"/>
+                          <a:cs typeface="Times New Roman" panose="02020603050405020304" pitchFamily="18" charset="0"/>
+                        </a:rPr>
+                        <a:t>0</a:t>
+                      </a:r>
+                    </a:p>
+                  </a:txBody>
+                  <a:tcPr/>
+                </a:tc>
+                <a:tc>
+                  <a:txBody>
+                    <a:bodyPr/>
+                    <a:lstStyle/>
+                    <a:p>
+                      <a:pPr algn="ctr"/>
+                      <a:r>
+                        <a:rPr lang="en-US" b="0" dirty="0">
+                          <a:latin typeface="Times New Roman" panose="02020603050405020304" pitchFamily="18" charset="0"/>
+                          <a:cs typeface="Times New Roman" panose="02020603050405020304" pitchFamily="18" charset="0"/>
+                        </a:rPr>
+                        <a:t>18</a:t>
+                      </a:r>
+                    </a:p>
+                  </a:txBody>
+                  <a:tcPr/>
+                </a:tc>
+                <a:extLst>
+                  <a:ext uri="{0D108BD9-81ED-4DB2-BD59-A6C34878D82A}">
+                    <a16:rowId xmlns:a16="http://schemas.microsoft.com/office/drawing/2014/main" val="2794636180"/>
+                  </a:ext>
+                </a:extLst>
+              </a:tr>
+              <a:tr h="369039">
+                <a:tc>
+                  <a:txBody>
+                    <a:bodyPr/>
+                    <a:lstStyle/>
+                    <a:p>
+                      <a:pPr algn="l"/>
+                      <a:r>
+                        <a:rPr lang="en-US" b="0">
+                          <a:latin typeface="Times New Roman" panose="02020603050405020304" pitchFamily="18" charset="0"/>
+                          <a:cs typeface="Times New Roman" panose="02020603050405020304" pitchFamily="18" charset="0"/>
+                        </a:rPr>
+                        <a:t>T12</a:t>
+                      </a:r>
+                      <a:endParaRPr lang="en-US" b="0" dirty="0">
+                        <a:latin typeface="Times New Roman" panose="02020603050405020304" pitchFamily="18" charset="0"/>
+                        <a:cs typeface="Times New Roman" panose="02020603050405020304" pitchFamily="18" charset="0"/>
+                      </a:endParaRPr>
+                    </a:p>
+                  </a:txBody>
+                  <a:tcPr/>
+                </a:tc>
+                <a:tc>
+                  <a:txBody>
+                    <a:bodyPr/>
+                    <a:lstStyle/>
+                    <a:p>
+                      <a:pPr algn="ctr"/>
+                      <a:r>
+                        <a:rPr lang="en-US" b="0" dirty="0">
+                          <a:latin typeface="Times New Roman" panose="02020603050405020304" pitchFamily="18" charset="0"/>
+                          <a:cs typeface="Times New Roman" panose="02020603050405020304" pitchFamily="18" charset="0"/>
+                        </a:rPr>
+                        <a:t>0</a:t>
+                      </a:r>
+                    </a:p>
+                  </a:txBody>
+                  <a:tcPr/>
+                </a:tc>
+                <a:tc>
+                  <a:txBody>
+                    <a:bodyPr/>
+                    <a:lstStyle/>
+                    <a:p>
+                      <a:pPr algn="ctr"/>
+                      <a:r>
+                        <a:rPr lang="en-US" b="0" dirty="0">
+                          <a:latin typeface="Times New Roman" panose="02020603050405020304" pitchFamily="18" charset="0"/>
+                          <a:cs typeface="Times New Roman" panose="02020603050405020304" pitchFamily="18" charset="0"/>
+                        </a:rPr>
+                        <a:t>100</a:t>
+                      </a:r>
+                    </a:p>
+                  </a:txBody>
+                  <a:tcPr/>
+                </a:tc>
+                <a:tc>
+                  <a:txBody>
+                    <a:bodyPr/>
+                    <a:lstStyle/>
+                    <a:p>
+                      <a:pPr algn="ctr"/>
+                      <a:r>
+                        <a:rPr lang="en-US" b="0" dirty="0">
+                          <a:latin typeface="Times New Roman" panose="02020603050405020304" pitchFamily="18" charset="0"/>
+                          <a:cs typeface="Times New Roman" panose="02020603050405020304" pitchFamily="18" charset="0"/>
+                        </a:rPr>
+                        <a:t>0</a:t>
+                      </a:r>
+                    </a:p>
+                  </a:txBody>
+                  <a:tcPr/>
+                </a:tc>
+                <a:extLst>
+                  <a:ext uri="{0D108BD9-81ED-4DB2-BD59-A6C34878D82A}">
+                    <a16:rowId xmlns:a16="http://schemas.microsoft.com/office/drawing/2014/main" val="4130347233"/>
+                  </a:ext>
+                </a:extLst>
+              </a:tr>
+            </a:tbl>
+          </a:graphicData>
+        </a:graphic>
+      </p:graphicFrame>
+      <p:sp>
+        <p:nvSpPr>
+          <p:cNvPr id="17" name="TextBox 16">
+            <a:extLst>
+              <a:ext uri="{FF2B5EF4-FFF2-40B4-BE49-F238E27FC236}">
+                <a16:creationId xmlns:a16="http://schemas.microsoft.com/office/drawing/2014/main" id="{B3CC6AB7-FAE7-4A3A-9495-776CC4D01C9C}"/>
+              </a:ext>
+            </a:extLst>
+          </p:cNvPr>
+          <p:cNvSpPr txBox="1"/>
+          <p:nvPr/>
+        </p:nvSpPr>
+        <p:spPr>
+          <a:xfrm>
+            <a:off x="6218057" y="607642"/>
+            <a:ext cx="5698610" cy="430887"/>
+          </a:xfrm>
+          <a:prstGeom prst="rect">
+            <a:avLst/>
+          </a:prstGeom>
+          <a:noFill/>
+        </p:spPr>
+        <p:txBody>
+          <a:bodyPr wrap="square" rtlCol="0">
+            <a:spAutoFit/>
+          </a:bodyPr>
+          <a:lstStyle/>
+          <a:p>
+            <a:r>
+              <a:rPr lang="en-US" sz="2200" dirty="0">
+                <a:latin typeface="Times New Roman" panose="02020603050405020304" pitchFamily="18" charset="0"/>
+                <a:cs typeface="Times New Roman" panose="02020603050405020304" pitchFamily="18" charset="0"/>
+              </a:rPr>
+              <a:t>Table 2: Classification result</a:t>
+            </a:r>
+          </a:p>
+        </p:txBody>
+      </p:sp>
+      <p:sp>
+        <p:nvSpPr>
+          <p:cNvPr id="18" name="TextBox 17">
+            <a:extLst>
+              <a:ext uri="{FF2B5EF4-FFF2-40B4-BE49-F238E27FC236}">
+                <a16:creationId xmlns:a16="http://schemas.microsoft.com/office/drawing/2014/main" id="{AA7D8F68-4A53-4931-8A87-93DF5C2786D1}"/>
+              </a:ext>
+            </a:extLst>
+          </p:cNvPr>
+          <p:cNvSpPr txBox="1"/>
+          <p:nvPr/>
+        </p:nvSpPr>
+        <p:spPr>
+          <a:xfrm>
+            <a:off x="1014060" y="5173774"/>
+            <a:ext cx="5698610" cy="430887"/>
+          </a:xfrm>
+          <a:prstGeom prst="rect">
+            <a:avLst/>
+          </a:prstGeom>
+          <a:noFill/>
+        </p:spPr>
+        <p:txBody>
+          <a:bodyPr wrap="square" rtlCol="0">
+            <a:spAutoFit/>
+          </a:bodyPr>
+          <a:lstStyle/>
+          <a:p>
+            <a:r>
+              <a:rPr lang="en-US" sz="2200" dirty="0">
+                <a:latin typeface="Times New Roman" panose="02020603050405020304" pitchFamily="18" charset="0"/>
+                <a:cs typeface="Times New Roman" panose="02020603050405020304" pitchFamily="18" charset="0"/>
+              </a:rPr>
+              <a:t>Fig. 3: Classification result in bar graph</a:t>
+            </a:r>
+          </a:p>
+        </p:txBody>
+      </p:sp>
+    </p:spTree>
+    <p:extLst>
+      <p:ext uri="{BB962C8B-B14F-4D97-AF65-F5344CB8AC3E}">
+        <p14:creationId xmlns:p14="http://schemas.microsoft.com/office/powerpoint/2010/main" val="1403013341"/>
+      </p:ext>
+    </p:extLst>
+  </p:cSld>
+  <p:clrMapOvr>
+    <a:masterClrMapping/>
+  </p:clrMapOvr>
+</p:sld>
+</file>
+
+<file path=ppt/slides/slide15.xml><?xml version="1.0" encoding="utf-8"?>
+<p:sld xmlns:a="http://schemas.openxmlformats.org/drawingml/2006/main" xmlns:r="http://schemas.openxmlformats.org/officeDocument/2006/relationships" xmlns:p="http://schemas.openxmlformats.org/presentationml/2006/main">
+  <p:cSld>
+    <p:spTree>
+      <p:nvGrpSpPr>
+        <p:cNvPr id="1" name=""/>
+        <p:cNvGrpSpPr/>
+        <p:nvPr/>
+      </p:nvGrpSpPr>
+      <p:grpSpPr>
+        <a:xfrm>
+          <a:off x="0" y="0"/>
+          <a:ext cx="0" cy="0"/>
+          <a:chOff x="0" y="0"/>
+          <a:chExt cx="0" cy="0"/>
+        </a:xfrm>
+      </p:grpSpPr>
+      <p:sp>
+        <p:nvSpPr>
+          <p:cNvPr id="29" name="Rectangle 28">
+            <a:extLst>
+              <a:ext uri="{FF2B5EF4-FFF2-40B4-BE49-F238E27FC236}">
+                <a16:creationId xmlns:a16="http://schemas.microsoft.com/office/drawing/2014/main" id="{2B566528-1B12-4246-9431-5C2D7D081168}"/>
+              </a:ext>
+              <a:ext uri="{C183D7F6-B498-43B3-948B-1728B52AA6E4}">
+                <adec:decorative xmlns:adec="http://schemas.microsoft.com/office/drawing/2017/decorative" val="1"/>
+              </a:ext>
+            </a:extLst>
+          </p:cNvPr>
+          <p:cNvSpPr>
+            <a:spLocks noGrp="1" noRot="1" noChangeAspect="1" noMove="1" noResize="1" noEditPoints="1" noAdjustHandles="1" noChangeArrowheads="1" noChangeShapeType="1" noTextEdit="1"/>
+          </p:cNvSpPr>
+          <p:nvPr>
+            <p:extLst>
+              <p:ext uri="{386F3935-93C4-4BCD-93E2-E3B085C9AB24}">
+                <p16:designElem xmlns:p16="http://schemas.microsoft.com/office/powerpoint/2015/main" val="1"/>
+              </p:ext>
+            </p:extLst>
+          </p:nvPr>
+        </p:nvSpPr>
+        <p:spPr>
+          <a:xfrm>
+            <a:off x="0" y="0"/>
+            <a:ext cx="12192000" cy="6858000"/>
+          </a:xfrm>
+          <a:prstGeom prst="rect">
+            <a:avLst/>
+          </a:prstGeom>
+          <a:solidFill>
+            <a:schemeClr val="bg1"/>
+          </a:solidFill>
+          <a:ln>
+            <a:noFill/>
+          </a:ln>
+        </p:spPr>
+        <p:style>
+          <a:lnRef idx="2">
+            <a:schemeClr val="accent1">
+              <a:shade val="50000"/>
+            </a:schemeClr>
+          </a:lnRef>
+          <a:fillRef idx="1">
+            <a:schemeClr val="accent1"/>
+          </a:fillRef>
+          <a:effectRef idx="0">
+            <a:schemeClr val="accent1"/>
+          </a:effectRef>
+          <a:fontRef idx="minor">
+            <a:schemeClr val="lt1"/>
+          </a:fontRef>
+        </p:style>
+        <p:txBody>
+          <a:bodyPr rtlCol="0" anchor="ctr"/>
+          <a:lstStyle/>
+          <a:p>
+            <a:pPr algn="ctr"/>
+            <a:endParaRPr lang="en-US" dirty="0"/>
+          </a:p>
+        </p:txBody>
+      </p:sp>
+      <p:grpSp>
+        <p:nvGrpSpPr>
+          <p:cNvPr id="34" name="Group 30">
+            <a:extLst>
+              <a:ext uri="{FF2B5EF4-FFF2-40B4-BE49-F238E27FC236}">
+                <a16:creationId xmlns:a16="http://schemas.microsoft.com/office/drawing/2014/main" id="{FA366754-A2F4-475B-8217-AB06F5F15F36}"/>
+              </a:ext>
+              <a:ext uri="{C183D7F6-B498-43B3-948B-1728B52AA6E4}">
+                <adec:decorative xmlns:adec="http://schemas.microsoft.com/office/drawing/2017/decorative" val="1"/>
+              </a:ext>
+            </a:extLst>
+          </p:cNvPr>
+          <p:cNvGrpSpPr>
+            <a:grpSpLocks noGrp="1" noUngrp="1" noRot="1" noChangeAspect="1" noMove="1" noResize="1"/>
+          </p:cNvGrpSpPr>
+          <p:nvPr>
+            <p:extLst>
+              <p:ext uri="{386F3935-93C4-4BCD-93E2-E3B085C9AB24}">
+                <p16:designElem xmlns:p16="http://schemas.microsoft.com/office/powerpoint/2015/main" val="1"/>
+              </p:ext>
+            </p:extLst>
+          </p:nvPr>
+        </p:nvGrpSpPr>
+        <p:grpSpPr>
+          <a:xfrm>
+            <a:off x="11219290" y="1"/>
+            <a:ext cx="972709" cy="1935307"/>
+            <a:chOff x="10918968" y="713127"/>
+            <a:chExt cx="1273032" cy="2532832"/>
+          </a:xfrm>
+        </p:grpSpPr>
+        <p:sp>
+          <p:nvSpPr>
+            <p:cNvPr id="38" name="Rectangle 31">
+              <a:extLst>
+                <a:ext uri="{FF2B5EF4-FFF2-40B4-BE49-F238E27FC236}">
+                  <a16:creationId xmlns:a16="http://schemas.microsoft.com/office/drawing/2014/main" id="{322BF2F0-5264-48F8-8780-73D64DE8487C}"/>
+                </a:ext>
+                <a:ext uri="{C183D7F6-B498-43B3-948B-1728B52AA6E4}">
+                  <adec:decorative xmlns:adec="http://schemas.microsoft.com/office/drawing/2017/decorative" val="1"/>
+                </a:ext>
+              </a:extLst>
+            </p:cNvPr>
+            <p:cNvSpPr/>
+            <p:nvPr>
+              <p:extLst>
+                <p:ext uri="{386F3935-93C4-4BCD-93E2-E3B085C9AB24}">
+                  <p16:designElem xmlns:p16="http://schemas.microsoft.com/office/powerpoint/2015/main" val="1"/>
+                </p:ext>
+              </p:extLst>
+            </p:nvPr>
+          </p:nvSpPr>
+          <p:spPr>
+            <a:xfrm rot="2700000">
+              <a:off x="11052629" y="2120024"/>
+              <a:ext cx="645368" cy="645368"/>
+            </a:xfrm>
+            <a:prstGeom prst="rect">
+              <a:avLst/>
+            </a:prstGeom>
+            <a:solidFill>
+              <a:schemeClr val="accent4">
+                <a:alpha val="30000"/>
+              </a:schemeClr>
+            </a:solidFill>
+            <a:ln>
+              <a:noFill/>
+            </a:ln>
+          </p:spPr>
+          <p:style>
+            <a:lnRef idx="2">
+              <a:schemeClr val="accent1">
+                <a:shade val="50000"/>
+              </a:schemeClr>
+            </a:lnRef>
+            <a:fillRef idx="1">
+              <a:schemeClr val="accent1"/>
+            </a:fillRef>
+            <a:effectRef idx="0">
+              <a:schemeClr val="accent1"/>
+            </a:effectRef>
+            <a:fontRef idx="minor">
+              <a:schemeClr val="lt1"/>
+            </a:fontRef>
+          </p:style>
+          <p:txBody>
+            <a:bodyPr rtlCol="0" anchor="ctr"/>
+            <a:lstStyle/>
+            <a:p>
+              <a:pPr algn="ctr"/>
+              <a:endParaRPr lang="en-US"/>
+            </a:p>
+          </p:txBody>
+        </p:sp>
+        <p:sp>
+          <p:nvSpPr>
+            <p:cNvPr id="33" name="Isosceles Triangle 32">
+              <a:extLst>
+                <a:ext uri="{FF2B5EF4-FFF2-40B4-BE49-F238E27FC236}">
+                  <a16:creationId xmlns:a16="http://schemas.microsoft.com/office/drawing/2014/main" id="{7DC5FF32-A8FD-4F1B-B8D3-3D226716C078}"/>
+                </a:ext>
+                <a:ext uri="{C183D7F6-B498-43B3-948B-1728B52AA6E4}">
+                  <adec:decorative xmlns:adec="http://schemas.microsoft.com/office/drawing/2017/decorative" val="1"/>
+                </a:ext>
+              </a:extLst>
+            </p:cNvPr>
+            <p:cNvSpPr/>
+            <p:nvPr>
+              <p:extLst>
+                <p:ext uri="{386F3935-93C4-4BCD-93E2-E3B085C9AB24}">
+                  <p16:designElem xmlns:p16="http://schemas.microsoft.com/office/powerpoint/2015/main" val="1"/>
+                </p:ext>
+              </p:extLst>
+            </p:nvPr>
+          </p:nvSpPr>
+          <p:spPr>
+            <a:xfrm rot="16200000">
+              <a:off x="10289068" y="1343027"/>
+              <a:ext cx="2532832" cy="1273032"/>
+            </a:xfrm>
+            <a:prstGeom prst="triangle">
+              <a:avLst>
+                <a:gd name="adj" fmla="val 50000"/>
+              </a:avLst>
+            </a:prstGeom>
+            <a:solidFill>
+              <a:schemeClr val="accent4">
+                <a:alpha val="30000"/>
+              </a:schemeClr>
+            </a:solidFill>
+            <a:ln>
+              <a:noFill/>
+            </a:ln>
+          </p:spPr>
+          <p:style>
+            <a:lnRef idx="2">
+              <a:schemeClr val="accent1">
+                <a:shade val="50000"/>
+              </a:schemeClr>
+            </a:lnRef>
+            <a:fillRef idx="1">
+              <a:schemeClr val="accent1"/>
+            </a:fillRef>
+            <a:effectRef idx="0">
+              <a:schemeClr val="accent1"/>
+            </a:effectRef>
+            <a:fontRef idx="minor">
+              <a:schemeClr val="lt1"/>
+            </a:fontRef>
+          </p:style>
+          <p:txBody>
+            <a:bodyPr rtlCol="0" anchor="ctr"/>
+            <a:lstStyle/>
+            <a:p>
+              <a:pPr algn="ctr"/>
+              <a:endParaRPr lang="en-US" dirty="0"/>
+            </a:p>
+          </p:txBody>
+        </p:sp>
+      </p:grpSp>
+      <p:grpSp>
+        <p:nvGrpSpPr>
+          <p:cNvPr id="35" name="Group 34">
+            <a:extLst>
+              <a:ext uri="{FF2B5EF4-FFF2-40B4-BE49-F238E27FC236}">
+                <a16:creationId xmlns:a16="http://schemas.microsoft.com/office/drawing/2014/main" id="{828A5161-06F1-46CF-8AD7-844680A59E13}"/>
+              </a:ext>
+              <a:ext uri="{C183D7F6-B498-43B3-948B-1728B52AA6E4}">
+                <adec:decorative xmlns:adec="http://schemas.microsoft.com/office/drawing/2017/decorative" val="1"/>
+              </a:ext>
+            </a:extLst>
+          </p:cNvPr>
+          <p:cNvGrpSpPr>
+            <a:grpSpLocks noGrp="1" noUngrp="1" noRot="1" noChangeAspect="1" noMove="1" noResize="1"/>
+          </p:cNvGrpSpPr>
+          <p:nvPr>
+            <p:extLst>
+              <p:ext uri="{386F3935-93C4-4BCD-93E2-E3B085C9AB24}">
+                <p16:designElem xmlns:p16="http://schemas.microsoft.com/office/powerpoint/2015/main" val="1"/>
+              </p:ext>
+            </p:extLst>
+          </p:nvPr>
+        </p:nvGrpSpPr>
+        <p:grpSpPr>
+          <a:xfrm>
+            <a:off x="0" y="4601497"/>
+            <a:ext cx="1014060" cy="2017580"/>
+            <a:chOff x="0" y="4601497"/>
+            <a:chExt cx="1014060" cy="2017580"/>
+          </a:xfrm>
+        </p:grpSpPr>
+        <p:sp>
+          <p:nvSpPr>
+            <p:cNvPr id="36" name="Isosceles Triangle 35">
+              <a:extLst>
+                <a:ext uri="{FF2B5EF4-FFF2-40B4-BE49-F238E27FC236}">
+                  <a16:creationId xmlns:a16="http://schemas.microsoft.com/office/drawing/2014/main" id="{D3F51FEB-38FB-4F6C-9F7B-2F2AFAB65463}"/>
+                </a:ext>
+                <a:ext uri="{C183D7F6-B498-43B3-948B-1728B52AA6E4}">
+                  <adec:decorative xmlns:adec="http://schemas.microsoft.com/office/drawing/2017/decorative" val="1"/>
+                </a:ext>
+              </a:extLst>
+            </p:cNvPr>
+            <p:cNvSpPr/>
+            <p:nvPr>
+              <p:extLst>
+                <p:ext uri="{386F3935-93C4-4BCD-93E2-E3B085C9AB24}">
+                  <p16:designElem xmlns:p16="http://schemas.microsoft.com/office/powerpoint/2015/main" val="1"/>
+                </p:ext>
+              </p:extLst>
+            </p:nvPr>
+          </p:nvSpPr>
+          <p:spPr>
+            <a:xfrm rot="5400000">
+              <a:off x="-501760" y="5103257"/>
+              <a:ext cx="2017580" cy="1014060"/>
+            </a:xfrm>
+            <a:prstGeom prst="triangle">
+              <a:avLst>
+                <a:gd name="adj" fmla="val 50000"/>
+              </a:avLst>
+            </a:prstGeom>
+            <a:solidFill>
+              <a:schemeClr val="accent1">
+                <a:alpha val="30000"/>
+              </a:schemeClr>
+            </a:solidFill>
+            <a:ln>
+              <a:noFill/>
+            </a:ln>
+          </p:spPr>
+          <p:style>
+            <a:lnRef idx="2">
+              <a:schemeClr val="accent1">
+                <a:shade val="50000"/>
+              </a:schemeClr>
+            </a:lnRef>
+            <a:fillRef idx="1">
+              <a:schemeClr val="accent1"/>
+            </a:fillRef>
+            <a:effectRef idx="0">
+              <a:schemeClr val="accent1"/>
+            </a:effectRef>
+            <a:fontRef idx="minor">
+              <a:schemeClr val="lt1"/>
+            </a:fontRef>
+          </p:style>
+          <p:txBody>
+            <a:bodyPr rtlCol="0" anchor="ctr"/>
+            <a:lstStyle/>
+            <a:p>
+              <a:pPr algn="ctr"/>
+              <a:endParaRPr lang="en-US"/>
+            </a:p>
+          </p:txBody>
+        </p:sp>
+        <p:sp>
+          <p:nvSpPr>
+            <p:cNvPr id="37" name="Rectangle 36">
+              <a:extLst>
+                <a:ext uri="{FF2B5EF4-FFF2-40B4-BE49-F238E27FC236}">
+                  <a16:creationId xmlns:a16="http://schemas.microsoft.com/office/drawing/2014/main" id="{1E547BA6-BAE0-43BB-A7CA-60F69CE252F0}"/>
+                </a:ext>
+                <a:ext uri="{C183D7F6-B498-43B3-948B-1728B52AA6E4}">
+                  <adec:decorative xmlns:adec="http://schemas.microsoft.com/office/drawing/2017/decorative" val="1"/>
+                </a:ext>
+              </a:extLst>
+            </p:cNvPr>
+            <p:cNvSpPr/>
+            <p:nvPr>
+              <p:extLst>
+                <p:ext uri="{386F3935-93C4-4BCD-93E2-E3B085C9AB24}">
+                  <p16:designElem xmlns:p16="http://schemas.microsoft.com/office/powerpoint/2015/main" val="1"/>
+                </p:ext>
+              </p:extLst>
+            </p:nvPr>
+          </p:nvSpPr>
+          <p:spPr>
+            <a:xfrm rot="2700000">
+              <a:off x="427916" y="5728708"/>
+              <a:ext cx="485578" cy="485578"/>
+            </a:xfrm>
+            <a:prstGeom prst="rect">
+              <a:avLst/>
+            </a:prstGeom>
+            <a:solidFill>
+              <a:schemeClr val="accent1">
+                <a:alpha val="30000"/>
+              </a:schemeClr>
+            </a:solidFill>
+            <a:ln>
+              <a:noFill/>
+            </a:ln>
+          </p:spPr>
+          <p:style>
+            <a:lnRef idx="2">
+              <a:schemeClr val="accent1">
+                <a:shade val="50000"/>
+              </a:schemeClr>
+            </a:lnRef>
+            <a:fillRef idx="1">
+              <a:schemeClr val="accent1"/>
+            </a:fillRef>
+            <a:effectRef idx="0">
+              <a:schemeClr val="accent1"/>
+            </a:effectRef>
+            <a:fontRef idx="minor">
+              <a:schemeClr val="lt1"/>
+            </a:fontRef>
+          </p:style>
+          <p:txBody>
+            <a:bodyPr rtlCol="0" anchor="ctr"/>
+            <a:lstStyle/>
+            <a:p>
+              <a:pPr algn="ctr"/>
+              <a:endParaRPr lang="en-US"/>
+            </a:p>
+          </p:txBody>
+        </p:sp>
+      </p:grpSp>
+      <p:sp>
+        <p:nvSpPr>
+          <p:cNvPr id="9" name="TextBox 8">
+            <a:extLst>
+              <a:ext uri="{FF2B5EF4-FFF2-40B4-BE49-F238E27FC236}">
+                <a16:creationId xmlns:a16="http://schemas.microsoft.com/office/drawing/2014/main" id="{39A9DCD3-F794-4C45-8A7D-CD57CBEEE291}"/>
+              </a:ext>
+            </a:extLst>
+          </p:cNvPr>
+          <p:cNvSpPr txBox="1"/>
+          <p:nvPr/>
+        </p:nvSpPr>
+        <p:spPr>
+          <a:xfrm>
+            <a:off x="643467" y="321734"/>
+            <a:ext cx="10905066" cy="1135737"/>
+          </a:xfrm>
+          <a:prstGeom prst="rect">
+            <a:avLst/>
+          </a:prstGeom>
+        </p:spPr>
+        <p:txBody>
+          <a:bodyPr vert="horz" lIns="91440" tIns="45720" rIns="91440" bIns="45720" rtlCol="0" anchor="ctr">
+            <a:normAutofit/>
+          </a:bodyPr>
+          <a:lstStyle/>
+          <a:p>
+            <a:pPr>
+              <a:lnSpc>
+                <a:spcPct val="90000"/>
+              </a:lnSpc>
+              <a:spcBef>
+                <a:spcPct val="0"/>
+              </a:spcBef>
+              <a:spcAft>
+                <a:spcPts val="600"/>
+              </a:spcAft>
+            </a:pPr>
+            <a:r>
+              <a:rPr lang="en-US" sz="3300" b="1" i="0" kern="1200" spc="-50" dirty="0">
+                <a:solidFill>
+                  <a:schemeClr val="tx1"/>
+                </a:solidFill>
+                <a:effectLst/>
+                <a:latin typeface="Times New Roman" panose="02020603050405020304" pitchFamily="18" charset="0"/>
+                <a:ea typeface="+mj-ea"/>
+                <a:cs typeface="Times New Roman" panose="02020603050405020304" pitchFamily="18" charset="0"/>
+              </a:rPr>
+              <a:t>Conclusion</a:t>
+            </a:r>
+          </a:p>
+        </p:txBody>
+      </p:sp>
+      <p:sp>
+        <p:nvSpPr>
+          <p:cNvPr id="10" name="TextBox 9">
+            <a:extLst>
+              <a:ext uri="{FF2B5EF4-FFF2-40B4-BE49-F238E27FC236}">
+                <a16:creationId xmlns:a16="http://schemas.microsoft.com/office/drawing/2014/main" id="{3E2366B4-DA4C-41BE-83B1-CFB5B8ABECD9}"/>
+              </a:ext>
+            </a:extLst>
+          </p:cNvPr>
+          <p:cNvSpPr txBox="1"/>
+          <p:nvPr/>
+        </p:nvSpPr>
+        <p:spPr>
+          <a:xfrm>
+            <a:off x="643468" y="1782981"/>
+            <a:ext cx="6842935" cy="4393982"/>
+          </a:xfrm>
+          <a:prstGeom prst="rect">
+            <a:avLst/>
+          </a:prstGeom>
+        </p:spPr>
+        <p:txBody>
+          <a:bodyPr vert="horz" lIns="91440" tIns="45720" rIns="91440" bIns="45720" rtlCol="0">
+            <a:normAutofit/>
+          </a:bodyPr>
+          <a:lstStyle/>
+          <a:p>
+            <a:pPr indent="-228600">
+              <a:lnSpc>
+                <a:spcPct val="90000"/>
+              </a:lnSpc>
+              <a:spcAft>
+                <a:spcPts val="600"/>
+              </a:spcAft>
+              <a:buClr>
+                <a:schemeClr val="accent1"/>
+              </a:buClr>
+              <a:buFont typeface="Arial" panose="020B0604020202020204" pitchFamily="34" charset="0"/>
+              <a:buChar char="•"/>
+            </a:pPr>
+            <a:r>
+              <a:rPr lang="en-US" sz="2200" dirty="0">
+                <a:latin typeface="Times New Roman" panose="02020603050405020304" pitchFamily="18" charset="0"/>
+                <a:cs typeface="Times New Roman" panose="02020603050405020304" pitchFamily="18" charset="0"/>
+              </a:rPr>
+              <a:t>Font : Times New Roman size 22</a:t>
+            </a:r>
+          </a:p>
+          <a:p>
+            <a:pPr indent="-228600">
+              <a:lnSpc>
+                <a:spcPct val="90000"/>
+              </a:lnSpc>
+              <a:spcAft>
+                <a:spcPts val="600"/>
+              </a:spcAft>
+              <a:buClr>
+                <a:schemeClr val="accent1"/>
+              </a:buClr>
+              <a:buFont typeface="Arial" panose="020B0604020202020204" pitchFamily="34" charset="0"/>
+              <a:buChar char="•"/>
+            </a:pPr>
+            <a:endParaRPr lang="en-US" sz="2200" dirty="0">
+              <a:latin typeface="Times New Roman" panose="02020603050405020304" pitchFamily="18" charset="0"/>
+              <a:cs typeface="Times New Roman" panose="02020603050405020304" pitchFamily="18" charset="0"/>
+            </a:endParaRPr>
+          </a:p>
+        </p:txBody>
+      </p:sp>
+    </p:spTree>
+    <p:extLst>
+      <p:ext uri="{BB962C8B-B14F-4D97-AF65-F5344CB8AC3E}">
+        <p14:creationId xmlns:p14="http://schemas.microsoft.com/office/powerpoint/2010/main" val="1291641331"/>
+      </p:ext>
+    </p:extLst>
+  </p:cSld>
+  <p:clrMapOvr>
+    <a:masterClrMapping/>
+  </p:clrMapOvr>
+</p:sld>
+</file>
+
+<file path=ppt/slides/slide2.xml><?xml version="1.0" encoding="utf-8"?>
+<p:sld xmlns:a="http://schemas.openxmlformats.org/drawingml/2006/main" xmlns:r="http://schemas.openxmlformats.org/officeDocument/2006/relationships" xmlns:p="http://schemas.openxmlformats.org/presentationml/2006/main">
+  <p:cSld>
+    <p:spTree>
+      <p:nvGrpSpPr>
+        <p:cNvPr id="1" name=""/>
+        <p:cNvGrpSpPr/>
+        <p:nvPr/>
+      </p:nvGrpSpPr>
+      <p:grpSpPr>
+        <a:xfrm>
+          <a:off x="0" y="0"/>
+          <a:ext cx="0" cy="0"/>
+          <a:chOff x="0" y="0"/>
+          <a:chExt cx="0" cy="0"/>
+        </a:xfrm>
+      </p:grpSpPr>
+      <p:sp>
+        <p:nvSpPr>
+          <p:cNvPr id="29" name="Rectangle 28">
+            <a:extLst>
+              <a:ext uri="{FF2B5EF4-FFF2-40B4-BE49-F238E27FC236}">
+                <a16:creationId xmlns:a16="http://schemas.microsoft.com/office/drawing/2014/main" id="{2B566528-1B12-4246-9431-5C2D7D081168}"/>
+              </a:ext>
+              <a:ext uri="{C183D7F6-B498-43B3-948B-1728B52AA6E4}">
+                <adec:decorative xmlns:adec="http://schemas.microsoft.com/office/drawing/2017/decorative" val="1"/>
+              </a:ext>
+            </a:extLst>
+          </p:cNvPr>
+          <p:cNvSpPr>
+            <a:spLocks noGrp="1" noRot="1" noChangeAspect="1" noMove="1" noResize="1" noEditPoints="1" noAdjustHandles="1" noChangeArrowheads="1" noChangeShapeType="1" noTextEdit="1"/>
+          </p:cNvSpPr>
+          <p:nvPr>
+            <p:extLst>
+              <p:ext uri="{386F3935-93C4-4BCD-93E2-E3B085C9AB24}">
+                <p16:designElem xmlns:p16="http://schemas.microsoft.com/office/powerpoint/2015/main" val="1"/>
+              </p:ext>
+            </p:extLst>
+          </p:nvPr>
+        </p:nvSpPr>
+        <p:spPr>
+          <a:xfrm>
+            <a:off x="0" y="0"/>
+            <a:ext cx="12192000" cy="6858000"/>
+          </a:xfrm>
+          <a:prstGeom prst="rect">
+            <a:avLst/>
+          </a:prstGeom>
+          <a:solidFill>
+            <a:schemeClr val="bg1"/>
+          </a:solidFill>
+          <a:ln>
+            <a:noFill/>
+          </a:ln>
+        </p:spPr>
+        <p:style>
+          <a:lnRef idx="2">
+            <a:schemeClr val="accent1">
+              <a:shade val="50000"/>
+            </a:schemeClr>
+          </a:lnRef>
+          <a:fillRef idx="1">
+            <a:schemeClr val="accent1"/>
+          </a:fillRef>
+          <a:effectRef idx="0">
+            <a:schemeClr val="accent1"/>
+          </a:effectRef>
+          <a:fontRef idx="minor">
+            <a:schemeClr val="lt1"/>
+          </a:fontRef>
+        </p:style>
+        <p:txBody>
+          <a:bodyPr rtlCol="0" anchor="ctr"/>
+          <a:lstStyle/>
+          <a:p>
+            <a:pPr algn="ctr"/>
+            <a:endParaRPr lang="en-US" dirty="0"/>
+          </a:p>
+        </p:txBody>
+      </p:sp>
+      <p:grpSp>
+        <p:nvGrpSpPr>
+          <p:cNvPr id="34" name="Group 30">
+            <a:extLst>
+              <a:ext uri="{FF2B5EF4-FFF2-40B4-BE49-F238E27FC236}">
+                <a16:creationId xmlns:a16="http://schemas.microsoft.com/office/drawing/2014/main" id="{FA366754-A2F4-475B-8217-AB06F5F15F36}"/>
+              </a:ext>
+              <a:ext uri="{C183D7F6-B498-43B3-948B-1728B52AA6E4}">
+                <adec:decorative xmlns:adec="http://schemas.microsoft.com/office/drawing/2017/decorative" val="1"/>
+              </a:ext>
+            </a:extLst>
+          </p:cNvPr>
+          <p:cNvGrpSpPr>
+            <a:grpSpLocks noGrp="1" noUngrp="1" noRot="1" noChangeAspect="1" noMove="1" noResize="1"/>
+          </p:cNvGrpSpPr>
+          <p:nvPr>
+            <p:extLst>
+              <p:ext uri="{386F3935-93C4-4BCD-93E2-E3B085C9AB24}">
+                <p16:designElem xmlns:p16="http://schemas.microsoft.com/office/powerpoint/2015/main" val="1"/>
+              </p:ext>
+            </p:extLst>
+          </p:nvPr>
+        </p:nvGrpSpPr>
+        <p:grpSpPr>
+          <a:xfrm>
+            <a:off x="11219290" y="1"/>
+            <a:ext cx="972709" cy="1935307"/>
+            <a:chOff x="10918968" y="713127"/>
+            <a:chExt cx="1273032" cy="2532832"/>
+          </a:xfrm>
+        </p:grpSpPr>
+        <p:sp>
+          <p:nvSpPr>
+            <p:cNvPr id="38" name="Rectangle 31">
+              <a:extLst>
+                <a:ext uri="{FF2B5EF4-FFF2-40B4-BE49-F238E27FC236}">
+                  <a16:creationId xmlns:a16="http://schemas.microsoft.com/office/drawing/2014/main" id="{322BF2F0-5264-48F8-8780-73D64DE8487C}"/>
+                </a:ext>
+                <a:ext uri="{C183D7F6-B498-43B3-948B-1728B52AA6E4}">
+                  <adec:decorative xmlns:adec="http://schemas.microsoft.com/office/drawing/2017/decorative" val="1"/>
+                </a:ext>
+              </a:extLst>
+            </p:cNvPr>
+            <p:cNvSpPr/>
+            <p:nvPr>
+              <p:extLst>
+                <p:ext uri="{386F3935-93C4-4BCD-93E2-E3B085C9AB24}">
+                  <p16:designElem xmlns:p16="http://schemas.microsoft.com/office/powerpoint/2015/main" val="1"/>
+                </p:ext>
+              </p:extLst>
+            </p:nvPr>
+          </p:nvSpPr>
+          <p:spPr>
+            <a:xfrm rot="2700000">
+              <a:off x="11052629" y="2120024"/>
+              <a:ext cx="645368" cy="645368"/>
+            </a:xfrm>
+            <a:prstGeom prst="rect">
+              <a:avLst/>
+            </a:prstGeom>
+            <a:solidFill>
+              <a:schemeClr val="accent4">
+                <a:alpha val="30000"/>
+              </a:schemeClr>
+            </a:solidFill>
+            <a:ln>
+              <a:noFill/>
+            </a:ln>
+          </p:spPr>
+          <p:style>
+            <a:lnRef idx="2">
+              <a:schemeClr val="accent1">
+                <a:shade val="50000"/>
+              </a:schemeClr>
+            </a:lnRef>
+            <a:fillRef idx="1">
+              <a:schemeClr val="accent1"/>
+            </a:fillRef>
+            <a:effectRef idx="0">
+              <a:schemeClr val="accent1"/>
+            </a:effectRef>
+            <a:fontRef idx="minor">
+              <a:schemeClr val="lt1"/>
+            </a:fontRef>
+          </p:style>
+          <p:txBody>
+            <a:bodyPr rtlCol="0" anchor="ctr"/>
+            <a:lstStyle/>
+            <a:p>
+              <a:pPr algn="ctr"/>
+              <a:endParaRPr lang="en-US"/>
+            </a:p>
+          </p:txBody>
+        </p:sp>
+        <p:sp>
+          <p:nvSpPr>
+            <p:cNvPr id="33" name="Isosceles Triangle 32">
+              <a:extLst>
+                <a:ext uri="{FF2B5EF4-FFF2-40B4-BE49-F238E27FC236}">
+                  <a16:creationId xmlns:a16="http://schemas.microsoft.com/office/drawing/2014/main" id="{7DC5FF32-A8FD-4F1B-B8D3-3D226716C078}"/>
+                </a:ext>
+                <a:ext uri="{C183D7F6-B498-43B3-948B-1728B52AA6E4}">
+                  <adec:decorative xmlns:adec="http://schemas.microsoft.com/office/drawing/2017/decorative" val="1"/>
+                </a:ext>
+              </a:extLst>
+            </p:cNvPr>
+            <p:cNvSpPr/>
+            <p:nvPr>
+              <p:extLst>
+                <p:ext uri="{386F3935-93C4-4BCD-93E2-E3B085C9AB24}">
+                  <p16:designElem xmlns:p16="http://schemas.microsoft.com/office/powerpoint/2015/main" val="1"/>
+                </p:ext>
+              </p:extLst>
+            </p:nvPr>
+          </p:nvSpPr>
+          <p:spPr>
+            <a:xfrm rot="16200000">
+              <a:off x="10289068" y="1343027"/>
+              <a:ext cx="2532832" cy="1273032"/>
+            </a:xfrm>
+            <a:prstGeom prst="triangle">
+              <a:avLst>
+                <a:gd name="adj" fmla="val 50000"/>
+              </a:avLst>
+            </a:prstGeom>
+            <a:solidFill>
+              <a:schemeClr val="accent4">
+                <a:alpha val="30000"/>
+              </a:schemeClr>
+            </a:solidFill>
+            <a:ln>
+              <a:noFill/>
+            </a:ln>
+          </p:spPr>
+          <p:style>
+            <a:lnRef idx="2">
+              <a:schemeClr val="accent1">
+                <a:shade val="50000"/>
+              </a:schemeClr>
+            </a:lnRef>
+            <a:fillRef idx="1">
+              <a:schemeClr val="accent1"/>
+            </a:fillRef>
+            <a:effectRef idx="0">
+              <a:schemeClr val="accent1"/>
+            </a:effectRef>
+            <a:fontRef idx="minor">
+              <a:schemeClr val="lt1"/>
+            </a:fontRef>
+          </p:style>
+          <p:txBody>
+            <a:bodyPr rtlCol="0" anchor="ctr"/>
+            <a:lstStyle/>
+            <a:p>
+              <a:pPr algn="ctr"/>
+              <a:endParaRPr lang="en-US" dirty="0"/>
+            </a:p>
+          </p:txBody>
+        </p:sp>
+      </p:grpSp>
+      <p:grpSp>
+        <p:nvGrpSpPr>
+          <p:cNvPr id="35" name="Group 34">
+            <a:extLst>
+              <a:ext uri="{FF2B5EF4-FFF2-40B4-BE49-F238E27FC236}">
+                <a16:creationId xmlns:a16="http://schemas.microsoft.com/office/drawing/2014/main" id="{828A5161-06F1-46CF-8AD7-844680A59E13}"/>
+              </a:ext>
+              <a:ext uri="{C183D7F6-B498-43B3-948B-1728B52AA6E4}">
+                <adec:decorative xmlns:adec="http://schemas.microsoft.com/office/drawing/2017/decorative" val="1"/>
+              </a:ext>
+            </a:extLst>
+          </p:cNvPr>
+          <p:cNvGrpSpPr>
+            <a:grpSpLocks noGrp="1" noUngrp="1" noRot="1" noChangeAspect="1" noMove="1" noResize="1"/>
+          </p:cNvGrpSpPr>
+          <p:nvPr>
+            <p:extLst>
+              <p:ext uri="{386F3935-93C4-4BCD-93E2-E3B085C9AB24}">
+                <p16:designElem xmlns:p16="http://schemas.microsoft.com/office/powerpoint/2015/main" val="1"/>
+              </p:ext>
+            </p:extLst>
+          </p:nvPr>
+        </p:nvGrpSpPr>
+        <p:grpSpPr>
+          <a:xfrm>
+            <a:off x="0" y="4601497"/>
+            <a:ext cx="1014060" cy="2017580"/>
+            <a:chOff x="0" y="4601497"/>
+            <a:chExt cx="1014060" cy="2017580"/>
+          </a:xfrm>
+        </p:grpSpPr>
+        <p:sp>
+          <p:nvSpPr>
+            <p:cNvPr id="36" name="Isosceles Triangle 35">
+              <a:extLst>
+                <a:ext uri="{FF2B5EF4-FFF2-40B4-BE49-F238E27FC236}">
+                  <a16:creationId xmlns:a16="http://schemas.microsoft.com/office/drawing/2014/main" id="{D3F51FEB-38FB-4F6C-9F7B-2F2AFAB65463}"/>
+                </a:ext>
+                <a:ext uri="{C183D7F6-B498-43B3-948B-1728B52AA6E4}">
+                  <adec:decorative xmlns:adec="http://schemas.microsoft.com/office/drawing/2017/decorative" val="1"/>
+                </a:ext>
+              </a:extLst>
+            </p:cNvPr>
+            <p:cNvSpPr/>
+            <p:nvPr>
+              <p:extLst>
+                <p:ext uri="{386F3935-93C4-4BCD-93E2-E3B085C9AB24}">
+                  <p16:designElem xmlns:p16="http://schemas.microsoft.com/office/powerpoint/2015/main" val="1"/>
+                </p:ext>
+              </p:extLst>
+            </p:nvPr>
+          </p:nvSpPr>
+          <p:spPr>
+            <a:xfrm rot="5400000">
+              <a:off x="-501760" y="5103257"/>
+              <a:ext cx="2017580" cy="1014060"/>
+            </a:xfrm>
+            <a:prstGeom prst="triangle">
+              <a:avLst>
+                <a:gd name="adj" fmla="val 50000"/>
+              </a:avLst>
+            </a:prstGeom>
+            <a:solidFill>
+              <a:schemeClr val="accent1">
+                <a:alpha val="30000"/>
+              </a:schemeClr>
+            </a:solidFill>
+            <a:ln>
+              <a:noFill/>
+            </a:ln>
+          </p:spPr>
+          <p:style>
+            <a:lnRef idx="2">
+              <a:schemeClr val="accent1">
+                <a:shade val="50000"/>
+              </a:schemeClr>
+            </a:lnRef>
+            <a:fillRef idx="1">
+              <a:schemeClr val="accent1"/>
+            </a:fillRef>
+            <a:effectRef idx="0">
+              <a:schemeClr val="accent1"/>
+            </a:effectRef>
+            <a:fontRef idx="minor">
+              <a:schemeClr val="lt1"/>
+            </a:fontRef>
+          </p:style>
+          <p:txBody>
+            <a:bodyPr rtlCol="0" anchor="ctr"/>
+            <a:lstStyle/>
+            <a:p>
+              <a:pPr algn="ctr"/>
+              <a:endParaRPr lang="en-US"/>
+            </a:p>
+          </p:txBody>
+        </p:sp>
+        <p:sp>
+          <p:nvSpPr>
+            <p:cNvPr id="37" name="Rectangle 36">
+              <a:extLst>
+                <a:ext uri="{FF2B5EF4-FFF2-40B4-BE49-F238E27FC236}">
+                  <a16:creationId xmlns:a16="http://schemas.microsoft.com/office/drawing/2014/main" id="{1E547BA6-BAE0-43BB-A7CA-60F69CE252F0}"/>
+                </a:ext>
+                <a:ext uri="{C183D7F6-B498-43B3-948B-1728B52AA6E4}">
+                  <adec:decorative xmlns:adec="http://schemas.microsoft.com/office/drawing/2017/decorative" val="1"/>
+                </a:ext>
+              </a:extLst>
+            </p:cNvPr>
+            <p:cNvSpPr/>
+            <p:nvPr>
+              <p:extLst>
+                <p:ext uri="{386F3935-93C4-4BCD-93E2-E3B085C9AB24}">
+                  <p16:designElem xmlns:p16="http://schemas.microsoft.com/office/powerpoint/2015/main" val="1"/>
+                </p:ext>
+              </p:extLst>
+            </p:nvPr>
+          </p:nvSpPr>
+          <p:spPr>
+            <a:xfrm rot="2700000">
+              <a:off x="427916" y="5728708"/>
+              <a:ext cx="485578" cy="485578"/>
+            </a:xfrm>
+            <a:prstGeom prst="rect">
+              <a:avLst/>
+            </a:prstGeom>
+            <a:solidFill>
+              <a:schemeClr val="accent1">
+                <a:alpha val="30000"/>
+              </a:schemeClr>
+            </a:solidFill>
+            <a:ln>
+              <a:noFill/>
+            </a:ln>
+          </p:spPr>
+          <p:style>
+            <a:lnRef idx="2">
+              <a:schemeClr val="accent1">
+                <a:shade val="50000"/>
+              </a:schemeClr>
+            </a:lnRef>
+            <a:fillRef idx="1">
+              <a:schemeClr val="accent1"/>
+            </a:fillRef>
+            <a:effectRef idx="0">
+              <a:schemeClr val="accent1"/>
+            </a:effectRef>
+            <a:fontRef idx="minor">
+              <a:schemeClr val="lt1"/>
+            </a:fontRef>
+          </p:style>
+          <p:txBody>
+            <a:bodyPr rtlCol="0" anchor="ctr"/>
+            <a:lstStyle/>
+            <a:p>
+              <a:pPr algn="ctr"/>
+              <a:endParaRPr lang="en-US"/>
+            </a:p>
+          </p:txBody>
+        </p:sp>
+      </p:grpSp>
+      <p:sp>
+        <p:nvSpPr>
           <p:cNvPr id="13" name="TextBox 12">
             <a:extLst>
               <a:ext uri="{FF2B5EF4-FFF2-40B4-BE49-F238E27FC236}">
@@ -9154,28 +12624,6 @@
                 <a:cs typeface="Times New Roman" panose="02020603050405020304" pitchFamily="18" charset="0"/>
               </a:rPr>
               <a:t>Experiment Design</a:t>
-            </a:r>
-          </a:p>
-          <a:p>
-            <a:pPr indent="-228600">
-              <a:lnSpc>
-                <a:spcPct val="90000"/>
-              </a:lnSpc>
-              <a:spcAft>
-                <a:spcPts val="600"/>
-              </a:spcAft>
-              <a:buClr>
-                <a:schemeClr val="accent1"/>
-              </a:buClr>
-              <a:buFont typeface="Arial" panose="020B0604020202020204" pitchFamily="34" charset="0"/>
-              <a:buChar char="•"/>
-            </a:pPr>
-            <a:r>
-              <a:rPr lang="en-US" sz="2200" dirty="0">
-                <a:latin typeface="Times New Roman" panose="02020603050405020304" pitchFamily="18" charset="0"/>
-                <a:cs typeface="Times New Roman" panose="02020603050405020304" pitchFamily="18" charset="0"/>
-              </a:rPr>
-              <a:t>Methodology</a:t>
             </a:r>
           </a:p>
           <a:p>
@@ -13606,8 +17054,8 @@
           </a:p>
         </p:txBody>
       </p:sp>
-      <mc:AlternateContent xmlns:mc="http://schemas.openxmlformats.org/markup-compatibility/2006">
-        <mc:Choice xmlns:a14="http://schemas.microsoft.com/office/drawing/2010/main" Requires="a14">
+      <mc:AlternateContent xmlns:mc="http://schemas.openxmlformats.org/markup-compatibility/2006" xmlns:a14="http://schemas.microsoft.com/office/drawing/2010/main">
+        <mc:Choice Requires="a14">
           <p:sp>
             <p:nvSpPr>
               <p:cNvPr id="4" name="TextBox 3">
@@ -13641,6 +17089,7 @@
               </a:bodyPr>
               <a:lstStyle/>
               <a:p>
+                <a:pPr/>
                 <a14:m>
                   <m:oMathPara xmlns:m="http://schemas.openxmlformats.org/officeDocument/2006/math">
                     <m:oMathParaPr>
@@ -13867,7 +17316,7 @@
             </p:txBody>
           </p:sp>
         </mc:Choice>
-        <mc:Fallback>
+        <mc:Fallback xmlns="">
           <p:sp>
             <p:nvSpPr>
               <p:cNvPr id="4" name="TextBox 3">
@@ -13917,8 +17366,8 @@
           </p:sp>
         </mc:Fallback>
       </mc:AlternateContent>
-      <mc:AlternateContent xmlns:mc="http://schemas.openxmlformats.org/markup-compatibility/2006">
-        <mc:Choice xmlns:a14="http://schemas.microsoft.com/office/drawing/2010/main" Requires="a14">
+      <mc:AlternateContent xmlns:mc="http://schemas.openxmlformats.org/markup-compatibility/2006" xmlns:a14="http://schemas.microsoft.com/office/drawing/2010/main">
+        <mc:Choice Requires="a14">
           <p:sp>
             <p:nvSpPr>
               <p:cNvPr id="56" name="TextBox 55">
@@ -14048,7 +17497,7 @@
                     <m:d>
                       <m:dPr>
                         <m:ctrlPr>
-                          <a:rPr lang="en-US" sz="2200" b="0" i="0" smtClean="0">
+                          <a:rPr lang="en-US" sz="2200" b="0" i="1" smtClean="0">
                             <a:latin typeface="Cambria Math" panose="02040503050406030204" pitchFamily="18" charset="0"/>
                           </a:rPr>
                         </m:ctrlPr>
@@ -14189,7 +17638,7 @@
             </p:txBody>
           </p:sp>
         </mc:Choice>
-        <mc:Fallback>
+        <mc:Fallback xmlns="">
           <p:sp>
             <p:nvSpPr>
               <p:cNvPr id="56" name="TextBox 55">

</xml_diff>